<commit_message>
Added computation manager arch diagram
</commit_message>
<xml_diff>
--- a/docs/architecture.pptx
+++ b/docs/architecture.pptx
@@ -6,6 +6,7 @@
   </p:sldMasterIdLst>
   <p:sldIdLst>
     <p:sldId id="256" r:id="rId2"/>
+    <p:sldId id="257" r:id="rId3"/>
   </p:sldIdLst>
   <p:sldSz cx="9144000" cy="6858000" type="screen4x3"/>
   <p:notesSz cx="6858000" cy="9144000"/>
@@ -288,7 +289,7 @@
           <a:p>
             <a:fld id="{CC6E0F3B-AF23-F040-AC8F-C945060863D3}" type="datetimeFigureOut">
               <a:rPr lang="en-US" smtClean="0"/>
-              <a:t>7/19/11</a:t>
+              <a:t>8/8/11</a:t>
             </a:fld>
             <a:endParaRPr lang="en-US"/>
           </a:p>
@@ -458,7 +459,7 @@
           <a:p>
             <a:fld id="{CC6E0F3B-AF23-F040-AC8F-C945060863D3}" type="datetimeFigureOut">
               <a:rPr lang="en-US" smtClean="0"/>
-              <a:t>7/19/11</a:t>
+              <a:t>8/8/11</a:t>
             </a:fld>
             <a:endParaRPr lang="en-US"/>
           </a:p>
@@ -638,7 +639,7 @@
           <a:p>
             <a:fld id="{CC6E0F3B-AF23-F040-AC8F-C945060863D3}" type="datetimeFigureOut">
               <a:rPr lang="en-US" smtClean="0"/>
-              <a:t>7/19/11</a:t>
+              <a:t>8/8/11</a:t>
             </a:fld>
             <a:endParaRPr lang="en-US"/>
           </a:p>
@@ -808,7 +809,7 @@
           <a:p>
             <a:fld id="{CC6E0F3B-AF23-F040-AC8F-C945060863D3}" type="datetimeFigureOut">
               <a:rPr lang="en-US" smtClean="0"/>
-              <a:t>7/19/11</a:t>
+              <a:t>8/8/11</a:t>
             </a:fld>
             <a:endParaRPr lang="en-US"/>
           </a:p>
@@ -1054,7 +1055,7 @@
           <a:p>
             <a:fld id="{CC6E0F3B-AF23-F040-AC8F-C945060863D3}" type="datetimeFigureOut">
               <a:rPr lang="en-US" smtClean="0"/>
-              <a:t>7/19/11</a:t>
+              <a:t>8/8/11</a:t>
             </a:fld>
             <a:endParaRPr lang="en-US"/>
           </a:p>
@@ -1342,7 +1343,7 @@
           <a:p>
             <a:fld id="{CC6E0F3B-AF23-F040-AC8F-C945060863D3}" type="datetimeFigureOut">
               <a:rPr lang="en-US" smtClean="0"/>
-              <a:t>7/19/11</a:t>
+              <a:t>8/8/11</a:t>
             </a:fld>
             <a:endParaRPr lang="en-US"/>
           </a:p>
@@ -1764,7 +1765,7 @@
           <a:p>
             <a:fld id="{CC6E0F3B-AF23-F040-AC8F-C945060863D3}" type="datetimeFigureOut">
               <a:rPr lang="en-US" smtClean="0"/>
-              <a:t>7/19/11</a:t>
+              <a:t>8/8/11</a:t>
             </a:fld>
             <a:endParaRPr lang="en-US"/>
           </a:p>
@@ -1882,7 +1883,7 @@
           <a:p>
             <a:fld id="{CC6E0F3B-AF23-F040-AC8F-C945060863D3}" type="datetimeFigureOut">
               <a:rPr lang="en-US" smtClean="0"/>
-              <a:t>7/19/11</a:t>
+              <a:t>8/8/11</a:t>
             </a:fld>
             <a:endParaRPr lang="en-US"/>
           </a:p>
@@ -1977,7 +1978,7 @@
           <a:p>
             <a:fld id="{CC6E0F3B-AF23-F040-AC8F-C945060863D3}" type="datetimeFigureOut">
               <a:rPr lang="en-US" smtClean="0"/>
-              <a:t>7/19/11</a:t>
+              <a:t>8/8/11</a:t>
             </a:fld>
             <a:endParaRPr lang="en-US"/>
           </a:p>
@@ -2254,7 +2255,7 @@
           <a:p>
             <a:fld id="{CC6E0F3B-AF23-F040-AC8F-C945060863D3}" type="datetimeFigureOut">
               <a:rPr lang="en-US" smtClean="0"/>
-              <a:t>7/19/11</a:t>
+              <a:t>8/8/11</a:t>
             </a:fld>
             <a:endParaRPr lang="en-US"/>
           </a:p>
@@ -2507,7 +2508,7 @@
           <a:p>
             <a:fld id="{CC6E0F3B-AF23-F040-AC8F-C945060863D3}" type="datetimeFigureOut">
               <a:rPr lang="en-US" smtClean="0"/>
-              <a:t>7/19/11</a:t>
+              <a:t>8/8/11</a:t>
             </a:fld>
             <a:endParaRPr lang="en-US"/>
           </a:p>
@@ -2720,7 +2721,7 @@
           <a:p>
             <a:fld id="{CC6E0F3B-AF23-F040-AC8F-C945060863D3}" type="datetimeFigureOut">
               <a:rPr lang="en-US" smtClean="0"/>
-              <a:t>7/19/11</a:t>
+              <a:t>8/8/11</a:t>
             </a:fld>
             <a:endParaRPr lang="en-US"/>
           </a:p>
@@ -3095,1225 +3096,2020 @@
           <a:chExt cx="0" cy="0"/>
         </a:xfrm>
       </p:grpSpPr>
-      <p:sp>
-        <p:nvSpPr>
-          <p:cNvPr id="4" name="Rounded Rectangle 3"/>
-          <p:cNvSpPr/>
+      <p:grpSp>
+        <p:nvGrpSpPr>
+          <p:cNvPr id="2" name="Group 1"/>
+          <p:cNvGrpSpPr/>
           <p:nvPr/>
-        </p:nvSpPr>
-        <p:spPr>
+        </p:nvGrpSpPr>
+        <p:grpSpPr>
           <a:xfrm>
-            <a:off x="1128894" y="1890886"/>
-            <a:ext cx="7210776" cy="395112"/>
+            <a:off x="931334" y="103013"/>
+            <a:ext cx="7916335" cy="5837765"/>
+            <a:chOff x="931334" y="103013"/>
+            <a:chExt cx="7916335" cy="5837765"/>
           </a:xfrm>
-          <a:prstGeom prst="roundRect">
-            <a:avLst/>
-          </a:prstGeom>
-        </p:spPr>
-        <p:style>
-          <a:lnRef idx="1">
-            <a:schemeClr val="accent1"/>
-          </a:lnRef>
-          <a:fillRef idx="3">
-            <a:schemeClr val="accent1"/>
-          </a:fillRef>
-          <a:effectRef idx="2">
-            <a:schemeClr val="accent1"/>
-          </a:effectRef>
-          <a:fontRef idx="minor">
-            <a:schemeClr val="lt1"/>
-          </a:fontRef>
-        </p:style>
-        <p:txBody>
-          <a:bodyPr rtlCol="0" anchor="ctr"/>
-          <a:lstStyle/>
-          <a:p>
-            <a:pPr algn="ctr"/>
-            <a:r>
-              <a:rPr lang="en-US" dirty="0" smtClean="0"/>
-              <a:t>Web Frontend</a:t>
-            </a:r>
-            <a:endParaRPr lang="en-US" dirty="0"/>
-          </a:p>
-        </p:txBody>
-      </p:sp>
-      <p:sp>
-        <p:nvSpPr>
-          <p:cNvPr id="5" name="Rounded Rectangle 4"/>
-          <p:cNvSpPr/>
-          <p:nvPr/>
-        </p:nvSpPr>
-        <p:spPr>
-          <a:xfrm>
-            <a:off x="2413000" y="2652888"/>
-            <a:ext cx="1284112" cy="1157111"/>
-          </a:xfrm>
-          <a:prstGeom prst="roundRect">
-            <a:avLst/>
-          </a:prstGeom>
-        </p:spPr>
-        <p:style>
-          <a:lnRef idx="1">
-            <a:schemeClr val="accent1"/>
-          </a:lnRef>
-          <a:fillRef idx="3">
-            <a:schemeClr val="accent1"/>
-          </a:fillRef>
-          <a:effectRef idx="2">
-            <a:schemeClr val="accent1"/>
-          </a:effectRef>
-          <a:fontRef idx="minor">
-            <a:schemeClr val="lt1"/>
-          </a:fontRef>
-        </p:style>
-        <p:txBody>
-          <a:bodyPr rtlCol="0" anchor="ctr"/>
-          <a:lstStyle/>
-          <a:p>
-            <a:pPr algn="ctr"/>
-            <a:r>
-              <a:rPr lang="en-US" dirty="0" smtClean="0"/>
-              <a:t>Data Set </a:t>
-            </a:r>
-            <a:br>
-              <a:rPr lang="en-US" dirty="0" smtClean="0"/>
-            </a:br>
-            <a:r>
-              <a:rPr lang="en-US" dirty="0" smtClean="0"/>
-              <a:t>Manager</a:t>
-            </a:r>
-            <a:endParaRPr lang="en-US" dirty="0"/>
-          </a:p>
-        </p:txBody>
-      </p:sp>
-      <p:cxnSp>
-        <p:nvCxnSpPr>
-          <p:cNvPr id="7" name="Straight Arrow Connector 6"/>
-          <p:cNvCxnSpPr/>
-          <p:nvPr/>
-        </p:nvCxnSpPr>
-        <p:spPr>
-          <a:xfrm>
-            <a:off x="1072440" y="2779890"/>
-            <a:ext cx="1312333" cy="0"/>
-          </a:xfrm>
-          <a:prstGeom prst="straightConnector1">
-            <a:avLst/>
-          </a:prstGeom>
-          <a:ln w="38100" cmpd="sng">
+        </p:grpSpPr>
+        <p:sp>
+          <p:nvSpPr>
+            <p:cNvPr id="4" name="Rounded Rectangle 3"/>
+            <p:cNvSpPr/>
+            <p:nvPr/>
+          </p:nvSpPr>
+          <p:spPr>
+            <a:xfrm>
+              <a:off x="1128894" y="1890886"/>
+              <a:ext cx="7210776" cy="395112"/>
+            </a:xfrm>
+            <a:prstGeom prst="roundRect">
+              <a:avLst/>
+            </a:prstGeom>
             <a:solidFill>
-              <a:srgbClr val="000000"/>
+              <a:srgbClr val="4F81BD"/>
             </a:solidFill>
-            <a:tailEnd type="arrow"/>
-          </a:ln>
-        </p:spPr>
-        <p:style>
-          <a:lnRef idx="2">
-            <a:schemeClr val="accent1"/>
-          </a:lnRef>
-          <a:fillRef idx="0">
-            <a:schemeClr val="accent1"/>
-          </a:fillRef>
-          <a:effectRef idx="1">
-            <a:schemeClr val="accent1"/>
-          </a:effectRef>
-          <a:fontRef idx="minor">
-            <a:schemeClr val="tx1"/>
-          </a:fontRef>
-        </p:style>
-      </p:cxnSp>
-      <p:sp>
-        <p:nvSpPr>
-          <p:cNvPr id="8" name="TextBox 7"/>
-          <p:cNvSpPr txBox="1"/>
-          <p:nvPr/>
-        </p:nvSpPr>
-        <p:spPr>
-          <a:xfrm>
-            <a:off x="931334" y="2794003"/>
-            <a:ext cx="1622772" cy="1200329"/>
-          </a:xfrm>
-          <a:prstGeom prst="rect">
-            <a:avLst/>
-          </a:prstGeom>
-          <a:noFill/>
-        </p:spPr>
-        <p:txBody>
-          <a:bodyPr wrap="square" rtlCol="0">
-            <a:spAutoFit/>
-          </a:bodyPr>
-          <a:lstStyle/>
-          <a:p>
-            <a:r>
-              <a:rPr lang="en-US" dirty="0" smtClean="0"/>
-              <a:t>1. Data Set</a:t>
-            </a:r>
-            <a:br>
-              <a:rPr lang="en-US" dirty="0" smtClean="0"/>
-            </a:br>
-            <a:r>
-              <a:rPr lang="en-US" dirty="0" smtClean="0"/>
-              <a:t>2. Data Parser</a:t>
-            </a:r>
-            <a:br>
-              <a:rPr lang="en-US" dirty="0" smtClean="0"/>
-            </a:br>
-            <a:r>
-              <a:rPr lang="en-US" dirty="0" smtClean="0"/>
-              <a:t>3. Privacy </a:t>
-            </a:r>
-            <a:r>
-              <a:rPr lang="en-US" dirty="0" smtClean="0">
-                <a:solidFill>
-                  <a:schemeClr val="bg1"/>
-                </a:solidFill>
-                <a:latin typeface="Lucida Grande"/>
-                <a:ea typeface="Lucida Grande"/>
-                <a:cs typeface="Lucida Grande"/>
-              </a:rPr>
-              <a:t>↵</a:t>
-            </a:r>
-            <a:r>
-              <a:rPr lang="en-US" dirty="0" smtClean="0"/>
-              <a:t>Budget (</a:t>
-            </a:r>
-            <a:r>
-              <a:rPr lang="en-US" dirty="0" err="1" smtClean="0"/>
-              <a:t>ε</a:t>
-            </a:r>
-            <a:r>
-              <a:rPr lang="en-US" dirty="0" smtClean="0"/>
-              <a:t>)</a:t>
-            </a:r>
-            <a:endParaRPr lang="en-US" dirty="0"/>
-          </a:p>
-        </p:txBody>
-      </p:sp>
-      <p:sp>
-        <p:nvSpPr>
-          <p:cNvPr id="9" name="Rectangle 8"/>
-          <p:cNvSpPr/>
-          <p:nvPr/>
-        </p:nvSpPr>
-        <p:spPr>
-          <a:xfrm>
-            <a:off x="1185337" y="4459111"/>
-            <a:ext cx="2271889" cy="1481667"/>
-          </a:xfrm>
-          <a:prstGeom prst="rect">
-            <a:avLst/>
-          </a:prstGeom>
-          <a:solidFill>
-            <a:schemeClr val="bg1">
-              <a:lumMod val="85000"/>
-            </a:schemeClr>
-          </a:solidFill>
-          <a:ln w="38100" cmpd="sng">
+          </p:spPr>
+          <p:style>
+            <a:lnRef idx="1">
+              <a:schemeClr val="accent1"/>
+            </a:lnRef>
+            <a:fillRef idx="3">
+              <a:schemeClr val="accent1"/>
+            </a:fillRef>
+            <a:effectRef idx="2">
+              <a:schemeClr val="accent1"/>
+            </a:effectRef>
+            <a:fontRef idx="minor">
+              <a:schemeClr val="lt1"/>
+            </a:fontRef>
+          </p:style>
+          <p:txBody>
+            <a:bodyPr rtlCol="0" anchor="ctr"/>
+            <a:lstStyle/>
+            <a:p>
+              <a:pPr algn="ctr"/>
+              <a:r>
+                <a:rPr lang="en-US" b="1" dirty="0" smtClean="0"/>
+                <a:t>Web Frontend</a:t>
+              </a:r>
+              <a:endParaRPr lang="en-US" b="1" dirty="0"/>
+            </a:p>
+          </p:txBody>
+        </p:sp>
+        <p:sp>
+          <p:nvSpPr>
+            <p:cNvPr id="5" name="Rounded Rectangle 4"/>
+            <p:cNvSpPr/>
+            <p:nvPr/>
+          </p:nvSpPr>
+          <p:spPr>
+            <a:xfrm>
+              <a:off x="2413000" y="2652888"/>
+              <a:ext cx="1284112" cy="1157111"/>
+            </a:xfrm>
+            <a:prstGeom prst="roundRect">
+              <a:avLst/>
+            </a:prstGeom>
             <a:solidFill>
+              <a:srgbClr val="4F81BD"/>
+            </a:solidFill>
+          </p:spPr>
+          <p:style>
+            <a:lnRef idx="1">
+              <a:schemeClr val="accent1"/>
+            </a:lnRef>
+            <a:fillRef idx="3">
+              <a:schemeClr val="accent1"/>
+            </a:fillRef>
+            <a:effectRef idx="2">
+              <a:schemeClr val="accent1"/>
+            </a:effectRef>
+            <a:fontRef idx="minor">
+              <a:schemeClr val="lt1"/>
+            </a:fontRef>
+          </p:style>
+          <p:txBody>
+            <a:bodyPr rtlCol="0" anchor="ctr"/>
+            <a:lstStyle/>
+            <a:p>
+              <a:pPr algn="ctr"/>
+              <a:r>
+                <a:rPr lang="en-US" b="1" dirty="0" smtClean="0"/>
+                <a:t>Data Set </a:t>
+              </a:r>
+              <a:br>
+                <a:rPr lang="en-US" b="1" dirty="0" smtClean="0"/>
+              </a:br>
+              <a:r>
+                <a:rPr lang="en-US" b="1" dirty="0" smtClean="0"/>
+                <a:t>Manager</a:t>
+              </a:r>
+              <a:endParaRPr lang="en-US" b="1" dirty="0"/>
+            </a:p>
+          </p:txBody>
+        </p:sp>
+        <p:cxnSp>
+          <p:nvCxnSpPr>
+            <p:cNvPr id="7" name="Straight Arrow Connector 6"/>
+            <p:cNvCxnSpPr/>
+            <p:nvPr/>
+          </p:nvCxnSpPr>
+          <p:spPr>
+            <a:xfrm>
+              <a:off x="1072440" y="2779890"/>
+              <a:ext cx="1312333" cy="0"/>
+            </a:xfrm>
+            <a:prstGeom prst="straightConnector1">
+              <a:avLst/>
+            </a:prstGeom>
+            <a:ln w="38100" cmpd="sng">
+              <a:solidFill>
+                <a:srgbClr val="000000"/>
+              </a:solidFill>
+              <a:tailEnd type="arrow"/>
+            </a:ln>
+          </p:spPr>
+          <p:style>
+            <a:lnRef idx="2">
+              <a:schemeClr val="accent1"/>
+            </a:lnRef>
+            <a:fillRef idx="0">
+              <a:schemeClr val="accent1"/>
+            </a:fillRef>
+            <a:effectRef idx="1">
+              <a:schemeClr val="accent1"/>
+            </a:effectRef>
+            <a:fontRef idx="minor">
               <a:schemeClr val="tx1"/>
+            </a:fontRef>
+          </p:style>
+        </p:cxnSp>
+        <p:sp>
+          <p:nvSpPr>
+            <p:cNvPr id="8" name="TextBox 7"/>
+            <p:cNvSpPr txBox="1"/>
+            <p:nvPr/>
+          </p:nvSpPr>
+          <p:spPr>
+            <a:xfrm>
+              <a:off x="931334" y="2794003"/>
+              <a:ext cx="1622772" cy="1200329"/>
+            </a:xfrm>
+            <a:prstGeom prst="rect">
+              <a:avLst/>
+            </a:prstGeom>
+            <a:noFill/>
+          </p:spPr>
+          <p:txBody>
+            <a:bodyPr wrap="square" rtlCol="0">
+              <a:spAutoFit/>
+            </a:bodyPr>
+            <a:lstStyle/>
+            <a:p>
+              <a:r>
+                <a:rPr lang="en-US" dirty="0" smtClean="0"/>
+                <a:t>1. Data Set</a:t>
+              </a:r>
+              <a:br>
+                <a:rPr lang="en-US" dirty="0" smtClean="0"/>
+              </a:br>
+              <a:r>
+                <a:rPr lang="en-US" dirty="0" smtClean="0"/>
+                <a:t>2. Data Parser</a:t>
+              </a:r>
+              <a:br>
+                <a:rPr lang="en-US" dirty="0" smtClean="0"/>
+              </a:br>
+              <a:r>
+                <a:rPr lang="en-US" dirty="0" smtClean="0"/>
+                <a:t>3. Privacy </a:t>
+              </a:r>
+              <a:r>
+                <a:rPr lang="en-US" dirty="0" smtClean="0">
+                  <a:solidFill>
+                    <a:schemeClr val="bg1"/>
+                  </a:solidFill>
+                  <a:latin typeface="Lucida Grande"/>
+                  <a:ea typeface="Lucida Grande"/>
+                  <a:cs typeface="Lucida Grande"/>
+                </a:rPr>
+                <a:t>↵</a:t>
+              </a:r>
+              <a:r>
+                <a:rPr lang="en-US" dirty="0" smtClean="0"/>
+                <a:t>Budget (</a:t>
+              </a:r>
+              <a:r>
+                <a:rPr lang="en-US" dirty="0" err="1" smtClean="0"/>
+                <a:t>ε</a:t>
+              </a:r>
+              <a:r>
+                <a:rPr lang="en-US" dirty="0" smtClean="0"/>
+                <a:t>)</a:t>
+              </a:r>
+              <a:endParaRPr lang="en-US" dirty="0"/>
+            </a:p>
+          </p:txBody>
+        </p:sp>
+        <p:sp>
+          <p:nvSpPr>
+            <p:cNvPr id="9" name="Rectangle 8"/>
+            <p:cNvSpPr/>
+            <p:nvPr/>
+          </p:nvSpPr>
+          <p:spPr>
+            <a:xfrm>
+              <a:off x="1185337" y="4459111"/>
+              <a:ext cx="2271889" cy="1481667"/>
+            </a:xfrm>
+            <a:prstGeom prst="rect">
+              <a:avLst/>
+            </a:prstGeom>
+            <a:solidFill>
+              <a:schemeClr val="bg1">
+                <a:lumMod val="85000"/>
+              </a:schemeClr>
             </a:solidFill>
-          </a:ln>
-        </p:spPr>
-        <p:style>
-          <a:lnRef idx="1">
-            <a:schemeClr val="accent1"/>
-          </a:lnRef>
-          <a:fillRef idx="3">
-            <a:schemeClr val="accent1"/>
-          </a:fillRef>
-          <a:effectRef idx="2">
-            <a:schemeClr val="accent1"/>
-          </a:effectRef>
-          <a:fontRef idx="minor">
-            <a:schemeClr val="lt1"/>
-          </a:fontRef>
-        </p:style>
-        <p:txBody>
-          <a:bodyPr rtlCol="0" anchor="ctr"/>
-          <a:lstStyle/>
-          <a:p>
-            <a:pPr algn="ctr"/>
-            <a:endParaRPr lang="en-US"/>
-          </a:p>
-        </p:txBody>
-      </p:sp>
-      <p:sp>
-        <p:nvSpPr>
-          <p:cNvPr id="10" name="Rectangle 9"/>
-          <p:cNvSpPr/>
-          <p:nvPr/>
-        </p:nvSpPr>
-        <p:spPr>
-          <a:xfrm>
-            <a:off x="3567294" y="5080000"/>
-            <a:ext cx="1185334" cy="860778"/>
-          </a:xfrm>
-          <a:prstGeom prst="rect">
-            <a:avLst/>
-          </a:prstGeom>
-          <a:solidFill>
-            <a:schemeClr val="bg1">
-              <a:lumMod val="85000"/>
-            </a:schemeClr>
-          </a:solidFill>
-          <a:ln w="38100" cmpd="sng">
+            <a:ln w="38100" cmpd="sng">
+              <a:solidFill>
+                <a:schemeClr val="tx1"/>
+              </a:solidFill>
+            </a:ln>
+          </p:spPr>
+          <p:style>
+            <a:lnRef idx="1">
+              <a:schemeClr val="accent1"/>
+            </a:lnRef>
+            <a:fillRef idx="3">
+              <a:schemeClr val="accent1"/>
+            </a:fillRef>
+            <a:effectRef idx="2">
+              <a:schemeClr val="accent1"/>
+            </a:effectRef>
+            <a:fontRef idx="minor">
+              <a:schemeClr val="lt1"/>
+            </a:fontRef>
+          </p:style>
+          <p:txBody>
+            <a:bodyPr rtlCol="0" anchor="ctr"/>
+            <a:lstStyle/>
+            <a:p>
+              <a:pPr algn="ctr"/>
+              <a:endParaRPr lang="en-US"/>
+            </a:p>
+          </p:txBody>
+        </p:sp>
+        <p:sp>
+          <p:nvSpPr>
+            <p:cNvPr id="10" name="Rectangle 9"/>
+            <p:cNvSpPr/>
+            <p:nvPr/>
+          </p:nvSpPr>
+          <p:spPr>
+            <a:xfrm>
+              <a:off x="3567294" y="5080000"/>
+              <a:ext cx="1185334" cy="860778"/>
+            </a:xfrm>
+            <a:prstGeom prst="rect">
+              <a:avLst/>
+            </a:prstGeom>
             <a:solidFill>
-              <a:schemeClr val="tx1"/>
+              <a:schemeClr val="bg1">
+                <a:lumMod val="85000"/>
+              </a:schemeClr>
             </a:solidFill>
-          </a:ln>
-        </p:spPr>
-        <p:style>
-          <a:lnRef idx="1">
-            <a:schemeClr val="accent1"/>
-          </a:lnRef>
-          <a:fillRef idx="3">
-            <a:schemeClr val="accent1"/>
-          </a:fillRef>
-          <a:effectRef idx="2">
-            <a:schemeClr val="accent1"/>
-          </a:effectRef>
-          <a:fontRef idx="minor">
-            <a:schemeClr val="lt1"/>
-          </a:fontRef>
-        </p:style>
-        <p:txBody>
-          <a:bodyPr rtlCol="0" anchor="ctr"/>
-          <a:lstStyle/>
-          <a:p>
-            <a:pPr algn="ctr"/>
-            <a:r>
-              <a:rPr lang="en-US" dirty="0" smtClean="0">
+            <a:ln w="38100" cmpd="sng">
+              <a:solidFill>
+                <a:schemeClr val="tx1"/>
+              </a:solidFill>
+            </a:ln>
+          </p:spPr>
+          <p:style>
+            <a:lnRef idx="1">
+              <a:schemeClr val="accent1"/>
+            </a:lnRef>
+            <a:fillRef idx="3">
+              <a:schemeClr val="accent1"/>
+            </a:fillRef>
+            <a:effectRef idx="2">
+              <a:schemeClr val="accent1"/>
+            </a:effectRef>
+            <a:fontRef idx="minor">
+              <a:schemeClr val="lt1"/>
+            </a:fontRef>
+          </p:style>
+          <p:txBody>
+            <a:bodyPr rtlCol="0" anchor="ctr"/>
+            <a:lstStyle/>
+            <a:p>
+              <a:pPr algn="ctr"/>
+              <a:r>
+                <a:rPr lang="en-US" dirty="0" smtClean="0">
+                  <a:solidFill>
+                    <a:schemeClr val="tx1"/>
+                  </a:solidFill>
+                </a:rPr>
+                <a:t>Isolated Execution Chambers</a:t>
+              </a:r>
+              <a:endParaRPr lang="en-US" dirty="0">
                 <a:solidFill>
                   <a:schemeClr val="tx1"/>
                 </a:solidFill>
-              </a:rPr>
-              <a:t>Isolated Execution Chambers</a:t>
-            </a:r>
-            <a:endParaRPr lang="en-US" dirty="0">
+              </a:endParaRPr>
+            </a:p>
+          </p:txBody>
+        </p:sp>
+        <p:sp>
+          <p:nvSpPr>
+            <p:cNvPr id="11" name="Rectangle 10"/>
+            <p:cNvSpPr/>
+            <p:nvPr/>
+          </p:nvSpPr>
+          <p:spPr>
+            <a:xfrm>
+              <a:off x="4879627" y="5080000"/>
+              <a:ext cx="1185334" cy="860778"/>
+            </a:xfrm>
+            <a:prstGeom prst="rect">
+              <a:avLst/>
+            </a:prstGeom>
+            <a:solidFill>
+              <a:schemeClr val="bg1">
+                <a:lumMod val="85000"/>
+              </a:schemeClr>
+            </a:solidFill>
+            <a:ln w="38100" cmpd="sng">
               <a:solidFill>
                 <a:schemeClr val="tx1"/>
               </a:solidFill>
-            </a:endParaRPr>
-          </a:p>
-        </p:txBody>
-      </p:sp>
-      <p:sp>
-        <p:nvSpPr>
-          <p:cNvPr id="11" name="Rectangle 10"/>
-          <p:cNvSpPr/>
-          <p:nvPr/>
-        </p:nvSpPr>
-        <p:spPr>
-          <a:xfrm>
-            <a:off x="4879627" y="5080000"/>
-            <a:ext cx="1185334" cy="860778"/>
-          </a:xfrm>
-          <a:prstGeom prst="rect">
-            <a:avLst/>
-          </a:prstGeom>
-          <a:solidFill>
-            <a:schemeClr val="bg1">
-              <a:lumMod val="85000"/>
-            </a:schemeClr>
-          </a:solidFill>
-          <a:ln w="38100" cmpd="sng">
-            <a:solidFill>
-              <a:schemeClr val="tx1"/>
-            </a:solidFill>
-          </a:ln>
-        </p:spPr>
-        <p:style>
-          <a:lnRef idx="1">
-            <a:schemeClr val="accent1"/>
-          </a:lnRef>
-          <a:fillRef idx="3">
-            <a:schemeClr val="accent1"/>
-          </a:fillRef>
-          <a:effectRef idx="2">
-            <a:schemeClr val="accent1"/>
-          </a:effectRef>
-          <a:fontRef idx="minor">
-            <a:schemeClr val="lt1"/>
-          </a:fontRef>
-        </p:style>
-        <p:txBody>
-          <a:bodyPr rtlCol="0" anchor="ctr"/>
-          <a:lstStyle/>
-          <a:p>
-            <a:pPr algn="ctr"/>
-            <a:r>
-              <a:rPr lang="en-US" dirty="0" smtClean="0">
+            </a:ln>
+          </p:spPr>
+          <p:style>
+            <a:lnRef idx="1">
+              <a:schemeClr val="accent1"/>
+            </a:lnRef>
+            <a:fillRef idx="3">
+              <a:schemeClr val="accent1"/>
+            </a:fillRef>
+            <a:effectRef idx="2">
+              <a:schemeClr val="accent1"/>
+            </a:effectRef>
+            <a:fontRef idx="minor">
+              <a:schemeClr val="lt1"/>
+            </a:fontRef>
+          </p:style>
+          <p:txBody>
+            <a:bodyPr rtlCol="0" anchor="ctr"/>
+            <a:lstStyle/>
+            <a:p>
+              <a:pPr algn="ctr"/>
+              <a:r>
+                <a:rPr lang="en-US" dirty="0" smtClean="0">
+                  <a:solidFill>
+                    <a:schemeClr val="tx1"/>
+                  </a:solidFill>
+                </a:rPr>
+                <a:t>Isolated Execution Chambers</a:t>
+              </a:r>
+              <a:endParaRPr lang="en-US" dirty="0">
                 <a:solidFill>
                   <a:schemeClr val="tx1"/>
                 </a:solidFill>
-              </a:rPr>
-              <a:t>Isolated Execution Chambers</a:t>
-            </a:r>
-            <a:endParaRPr lang="en-US" dirty="0">
+              </a:endParaRPr>
+            </a:p>
+          </p:txBody>
+        </p:sp>
+        <p:sp>
+          <p:nvSpPr>
+            <p:cNvPr id="12" name="Rectangle 11"/>
+            <p:cNvSpPr/>
+            <p:nvPr/>
+          </p:nvSpPr>
+          <p:spPr>
+            <a:xfrm>
+              <a:off x="6208893" y="5080000"/>
+              <a:ext cx="1185334" cy="860778"/>
+            </a:xfrm>
+            <a:prstGeom prst="rect">
+              <a:avLst/>
+            </a:prstGeom>
+            <a:solidFill>
+              <a:schemeClr val="bg1">
+                <a:lumMod val="85000"/>
+              </a:schemeClr>
+            </a:solidFill>
+            <a:ln w="38100" cmpd="sng">
               <a:solidFill>
                 <a:schemeClr val="tx1"/>
               </a:solidFill>
-            </a:endParaRPr>
-          </a:p>
-        </p:txBody>
-      </p:sp>
-      <p:sp>
-        <p:nvSpPr>
-          <p:cNvPr id="12" name="Rectangle 11"/>
-          <p:cNvSpPr/>
-          <p:nvPr/>
-        </p:nvSpPr>
-        <p:spPr>
-          <a:xfrm>
-            <a:off x="6208893" y="5080000"/>
-            <a:ext cx="1185334" cy="860778"/>
-          </a:xfrm>
-          <a:prstGeom prst="rect">
-            <a:avLst/>
-          </a:prstGeom>
-          <a:solidFill>
-            <a:schemeClr val="bg1">
-              <a:lumMod val="85000"/>
-            </a:schemeClr>
-          </a:solidFill>
-          <a:ln w="38100" cmpd="sng">
-            <a:solidFill>
-              <a:schemeClr val="tx1"/>
-            </a:solidFill>
-          </a:ln>
-        </p:spPr>
-        <p:style>
-          <a:lnRef idx="1">
-            <a:schemeClr val="accent1"/>
-          </a:lnRef>
-          <a:fillRef idx="3">
-            <a:schemeClr val="accent1"/>
-          </a:fillRef>
-          <a:effectRef idx="2">
-            <a:schemeClr val="accent1"/>
-          </a:effectRef>
-          <a:fontRef idx="minor">
-            <a:schemeClr val="lt1"/>
-          </a:fontRef>
-        </p:style>
-        <p:txBody>
-          <a:bodyPr rtlCol="0" anchor="ctr"/>
-          <a:lstStyle/>
-          <a:p>
-            <a:pPr algn="ctr"/>
-            <a:r>
-              <a:rPr lang="en-US" dirty="0" smtClean="0">
+            </a:ln>
+          </p:spPr>
+          <p:style>
+            <a:lnRef idx="1">
+              <a:schemeClr val="accent1"/>
+            </a:lnRef>
+            <a:fillRef idx="3">
+              <a:schemeClr val="accent1"/>
+            </a:fillRef>
+            <a:effectRef idx="2">
+              <a:schemeClr val="accent1"/>
+            </a:effectRef>
+            <a:fontRef idx="minor">
+              <a:schemeClr val="lt1"/>
+            </a:fontRef>
+          </p:style>
+          <p:txBody>
+            <a:bodyPr rtlCol="0" anchor="ctr"/>
+            <a:lstStyle/>
+            <a:p>
+              <a:pPr algn="ctr"/>
+              <a:r>
+                <a:rPr lang="en-US" dirty="0" smtClean="0">
+                  <a:solidFill>
+                    <a:schemeClr val="tx1"/>
+                  </a:solidFill>
+                </a:rPr>
+                <a:t>Isolated Execution Chambers</a:t>
+              </a:r>
+              <a:endParaRPr lang="en-US" dirty="0">
                 <a:solidFill>
                   <a:schemeClr val="tx1"/>
                 </a:solidFill>
-              </a:rPr>
-              <a:t>Isolated Execution Chambers</a:t>
-            </a:r>
-            <a:endParaRPr lang="en-US" dirty="0">
-              <a:solidFill>
-                <a:schemeClr val="tx1"/>
-              </a:solidFill>
-            </a:endParaRPr>
-          </a:p>
-        </p:txBody>
-      </p:sp>
-      <p:sp>
-        <p:nvSpPr>
-          <p:cNvPr id="13" name="Rounded Rectangle 12"/>
-          <p:cNvSpPr/>
-          <p:nvPr/>
-        </p:nvSpPr>
-        <p:spPr>
-          <a:xfrm>
-            <a:off x="4572012" y="2652888"/>
-            <a:ext cx="1975555" cy="1157111"/>
-          </a:xfrm>
-          <a:prstGeom prst="roundRect">
-            <a:avLst/>
-          </a:prstGeom>
-        </p:spPr>
-        <p:style>
-          <a:lnRef idx="1">
-            <a:schemeClr val="accent1"/>
-          </a:lnRef>
-          <a:fillRef idx="3">
-            <a:schemeClr val="accent1"/>
-          </a:fillRef>
-          <a:effectRef idx="2">
-            <a:schemeClr val="accent1"/>
-          </a:effectRef>
-          <a:fontRef idx="minor">
-            <a:schemeClr val="lt1"/>
-          </a:fontRef>
-        </p:style>
-        <p:txBody>
-          <a:bodyPr rtlCol="0" anchor="ctr"/>
-          <a:lstStyle/>
-          <a:p>
-            <a:pPr algn="ctr"/>
-            <a:r>
-              <a:rPr lang="en-US" dirty="0" smtClean="0"/>
-              <a:t>Computation Manager</a:t>
-            </a:r>
-            <a:endParaRPr lang="en-US" dirty="0"/>
-          </a:p>
-        </p:txBody>
-      </p:sp>
-      <p:sp>
-        <p:nvSpPr>
-          <p:cNvPr id="14" name="Rounded Rectangle 13"/>
-          <p:cNvSpPr/>
-          <p:nvPr/>
-        </p:nvSpPr>
-        <p:spPr>
-          <a:xfrm>
-            <a:off x="1439338" y="5235222"/>
-            <a:ext cx="1848556" cy="635000"/>
-          </a:xfrm>
-          <a:prstGeom prst="roundRect">
-            <a:avLst/>
-          </a:prstGeom>
-          <a:solidFill>
-            <a:schemeClr val="accent2">
-              <a:lumMod val="40000"/>
-              <a:lumOff val="60000"/>
-            </a:schemeClr>
-          </a:solidFill>
-        </p:spPr>
-        <p:style>
-          <a:lnRef idx="2">
-            <a:schemeClr val="accent2">
-              <a:shade val="50000"/>
-            </a:schemeClr>
-          </a:lnRef>
-          <a:fillRef idx="1">
-            <a:schemeClr val="accent2"/>
-          </a:fillRef>
-          <a:effectRef idx="0">
-            <a:schemeClr val="accent2"/>
-          </a:effectRef>
-          <a:fontRef idx="minor">
-            <a:schemeClr val="lt1"/>
-          </a:fontRef>
-        </p:style>
-        <p:txBody>
-          <a:bodyPr rtlCol="0" anchor="ctr"/>
-          <a:lstStyle/>
-          <a:p>
-            <a:pPr algn="ctr"/>
-            <a:r>
-              <a:rPr lang="en-US" b="1" dirty="0" smtClean="0">
+              </a:endParaRPr>
+            </a:p>
+          </p:txBody>
+        </p:sp>
+        <p:sp>
+          <p:nvSpPr>
+            <p:cNvPr id="13" name="Rounded Rectangle 12"/>
+            <p:cNvSpPr/>
+            <p:nvPr/>
+          </p:nvSpPr>
+          <p:spPr>
+            <a:xfrm>
+              <a:off x="4572012" y="2652888"/>
+              <a:ext cx="1975555" cy="1157111"/>
+            </a:xfrm>
+            <a:prstGeom prst="roundRect">
+              <a:avLst/>
+            </a:prstGeom>
+            <a:solidFill>
+              <a:srgbClr val="4F81BD"/>
+            </a:solidFill>
+          </p:spPr>
+          <p:style>
+            <a:lnRef idx="1">
+              <a:schemeClr val="accent1"/>
+            </a:lnRef>
+            <a:fillRef idx="3">
+              <a:schemeClr val="accent1"/>
+            </a:fillRef>
+            <a:effectRef idx="2">
+              <a:schemeClr val="accent1"/>
+            </a:effectRef>
+            <a:fontRef idx="minor">
+              <a:schemeClr val="lt1"/>
+            </a:fontRef>
+          </p:style>
+          <p:txBody>
+            <a:bodyPr rtlCol="0" anchor="ctr"/>
+            <a:lstStyle/>
+            <a:p>
+              <a:pPr algn="ctr"/>
+              <a:r>
+                <a:rPr lang="en-US" b="1" dirty="0" smtClean="0"/>
+                <a:t>Computation Manager</a:t>
+              </a:r>
+              <a:endParaRPr lang="en-US" b="1" dirty="0"/>
+            </a:p>
+          </p:txBody>
+        </p:sp>
+        <p:sp>
+          <p:nvSpPr>
+            <p:cNvPr id="14" name="Rounded Rectangle 13"/>
+            <p:cNvSpPr/>
+            <p:nvPr/>
+          </p:nvSpPr>
+          <p:spPr>
+            <a:xfrm>
+              <a:off x="1439338" y="5235222"/>
+              <a:ext cx="1848556" cy="635000"/>
+            </a:xfrm>
+            <a:prstGeom prst="roundRect">
+              <a:avLst/>
+            </a:prstGeom>
+            <a:solidFill>
+              <a:schemeClr val="accent2">
+                <a:lumMod val="40000"/>
+                <a:lumOff val="60000"/>
+              </a:schemeClr>
+            </a:solidFill>
+          </p:spPr>
+          <p:style>
+            <a:lnRef idx="2">
+              <a:schemeClr val="accent2">
+                <a:shade val="50000"/>
+              </a:schemeClr>
+            </a:lnRef>
+            <a:fillRef idx="1">
+              <a:schemeClr val="accent2"/>
+            </a:fillRef>
+            <a:effectRef idx="0">
+              <a:schemeClr val="accent2"/>
+            </a:effectRef>
+            <a:fontRef idx="minor">
+              <a:schemeClr val="lt1"/>
+            </a:fontRef>
+          </p:style>
+          <p:txBody>
+            <a:bodyPr rtlCol="0" anchor="ctr"/>
+            <a:lstStyle/>
+            <a:p>
+              <a:pPr algn="ctr"/>
+              <a:r>
+                <a:rPr lang="en-US" b="1" dirty="0" smtClean="0">
+                  <a:solidFill>
+                    <a:srgbClr val="000000"/>
+                  </a:solidFill>
+                </a:rPr>
+                <a:t>Untrusted Computation</a:t>
+              </a:r>
+              <a:endParaRPr lang="en-US" b="1" dirty="0">
                 <a:solidFill>
                   <a:srgbClr val="000000"/>
                 </a:solidFill>
-              </a:rPr>
-              <a:t>Untrusted Computation</a:t>
-            </a:r>
-            <a:endParaRPr lang="en-US" b="1" dirty="0">
+              </a:endParaRPr>
+            </a:p>
+          </p:txBody>
+        </p:sp>
+        <p:sp>
+          <p:nvSpPr>
+            <p:cNvPr id="15" name="Rounded Rectangle 14"/>
+            <p:cNvSpPr/>
+            <p:nvPr/>
+          </p:nvSpPr>
+          <p:spPr>
+            <a:xfrm>
+              <a:off x="1227672" y="4586111"/>
+              <a:ext cx="2173110" cy="338666"/>
+            </a:xfrm>
+            <a:prstGeom prst="roundRect">
+              <a:avLst/>
+            </a:prstGeom>
+          </p:spPr>
+          <p:style>
+            <a:lnRef idx="1">
+              <a:schemeClr val="accent3"/>
+            </a:lnRef>
+            <a:fillRef idx="3">
+              <a:schemeClr val="accent3"/>
+            </a:fillRef>
+            <a:effectRef idx="2">
+              <a:schemeClr val="accent3"/>
+            </a:effectRef>
+            <a:fontRef idx="minor">
+              <a:schemeClr val="lt1"/>
+            </a:fontRef>
+          </p:style>
+          <p:txBody>
+            <a:bodyPr rtlCol="0" anchor="ctr"/>
+            <a:lstStyle/>
+            <a:p>
+              <a:pPr algn="ctr"/>
+              <a:r>
+                <a:rPr lang="en-US" sz="1400" b="1" dirty="0" smtClean="0">
+                  <a:solidFill>
+                    <a:srgbClr val="000000"/>
+                  </a:solidFill>
+                </a:rPr>
+                <a:t>Comp </a:t>
+              </a:r>
+              <a:r>
+                <a:rPr lang="en-US" sz="1400" b="1" dirty="0" err="1" smtClean="0">
+                  <a:solidFill>
+                    <a:srgbClr val="000000"/>
+                  </a:solidFill>
+                </a:rPr>
+                <a:t>Mgr</a:t>
+              </a:r>
+              <a:r>
+                <a:rPr lang="en-US" sz="1400" b="1" dirty="0" smtClean="0">
+                  <a:solidFill>
+                    <a:srgbClr val="000000"/>
+                  </a:solidFill>
+                </a:rPr>
+                <a:t> XML RPC Layer</a:t>
+              </a:r>
+              <a:endParaRPr lang="en-US" sz="1400" b="1" dirty="0">
+                <a:solidFill>
+                  <a:srgbClr val="000000"/>
+                </a:solidFill>
+              </a:endParaRPr>
+            </a:p>
+          </p:txBody>
+        </p:sp>
+        <p:pic>
+          <p:nvPicPr>
+            <p:cNvPr id="16" name="Picture 15"/>
+            <p:cNvPicPr>
+              <a:picLocks noChangeAspect="1"/>
+            </p:cNvPicPr>
+            <p:nvPr/>
+          </p:nvPicPr>
+          <p:blipFill>
+            <a:blip r:embed="rId2"/>
+            <a:stretch>
+              <a:fillRect/>
+            </a:stretch>
+          </p:blipFill>
+          <p:spPr>
+            <a:xfrm>
+              <a:off x="3807180" y="103013"/>
+              <a:ext cx="946187" cy="898878"/>
+            </a:xfrm>
+            <a:prstGeom prst="rect">
+              <a:avLst/>
+            </a:prstGeom>
+          </p:spPr>
+        </p:pic>
+        <p:cxnSp>
+          <p:nvCxnSpPr>
+            <p:cNvPr id="18" name="Straight Arrow Connector 17"/>
+            <p:cNvCxnSpPr/>
+            <p:nvPr/>
+          </p:nvCxnSpPr>
+          <p:spPr>
+            <a:xfrm>
+              <a:off x="4007559" y="1001891"/>
+              <a:ext cx="0" cy="888995"/>
+            </a:xfrm>
+            <a:prstGeom prst="straightConnector1">
+              <a:avLst/>
+            </a:prstGeom>
+            <a:ln w="38100" cmpd="sng">
               <a:solidFill>
                 <a:srgbClr val="000000"/>
               </a:solidFill>
-            </a:endParaRPr>
-          </a:p>
-        </p:txBody>
-      </p:sp>
-      <p:sp>
-        <p:nvSpPr>
-          <p:cNvPr id="15" name="Rounded Rectangle 14"/>
-          <p:cNvSpPr/>
-          <p:nvPr/>
-        </p:nvSpPr>
-        <p:spPr>
-          <a:xfrm>
-            <a:off x="1227672" y="4586111"/>
-            <a:ext cx="2173110" cy="338666"/>
-          </a:xfrm>
-          <a:prstGeom prst="roundRect">
-            <a:avLst/>
-          </a:prstGeom>
-        </p:spPr>
-        <p:style>
-          <a:lnRef idx="1">
-            <a:schemeClr val="accent3"/>
-          </a:lnRef>
-          <a:fillRef idx="3">
-            <a:schemeClr val="accent3"/>
-          </a:fillRef>
-          <a:effectRef idx="2">
-            <a:schemeClr val="accent3"/>
-          </a:effectRef>
-          <a:fontRef idx="minor">
-            <a:schemeClr val="lt1"/>
-          </a:fontRef>
-        </p:style>
-        <p:txBody>
-          <a:bodyPr rtlCol="0" anchor="ctr"/>
-          <a:lstStyle/>
-          <a:p>
-            <a:pPr algn="ctr"/>
-            <a:r>
-              <a:rPr lang="en-US" sz="1400" b="1" dirty="0" smtClean="0">
-                <a:solidFill>
-                  <a:srgbClr val="000000"/>
-                </a:solidFill>
-              </a:rPr>
-              <a:t>Comp </a:t>
-            </a:r>
-            <a:r>
-              <a:rPr lang="en-US" sz="1400" b="1" dirty="0" err="1" smtClean="0">
-                <a:solidFill>
-                  <a:srgbClr val="000000"/>
-                </a:solidFill>
-              </a:rPr>
-              <a:t>Mgr</a:t>
-            </a:r>
-            <a:r>
-              <a:rPr lang="en-US" sz="1400" b="1" dirty="0" smtClean="0">
-                <a:solidFill>
-                  <a:srgbClr val="000000"/>
-                </a:solidFill>
-              </a:rPr>
-              <a:t> XML RPC Layer</a:t>
-            </a:r>
-            <a:endParaRPr lang="en-US" sz="1400" b="1" dirty="0">
+              <a:tailEnd type="arrow"/>
+            </a:ln>
+          </p:spPr>
+          <p:style>
+            <a:lnRef idx="2">
+              <a:schemeClr val="accent1"/>
+            </a:lnRef>
+            <a:fillRef idx="0">
+              <a:schemeClr val="accent1"/>
+            </a:fillRef>
+            <a:effectRef idx="1">
+              <a:schemeClr val="accent1"/>
+            </a:effectRef>
+            <a:fontRef idx="minor">
+              <a:schemeClr val="tx1"/>
+            </a:fontRef>
+          </p:style>
+        </p:cxnSp>
+        <p:cxnSp>
+          <p:nvCxnSpPr>
+            <p:cNvPr id="19" name="Straight Arrow Connector 18"/>
+            <p:cNvCxnSpPr/>
+            <p:nvPr/>
+          </p:nvCxnSpPr>
+          <p:spPr>
+            <a:xfrm flipV="1">
+              <a:off x="4456293" y="1001891"/>
+              <a:ext cx="0" cy="888995"/>
+            </a:xfrm>
+            <a:prstGeom prst="straightConnector1">
+              <a:avLst/>
+            </a:prstGeom>
+            <a:ln w="38100" cmpd="sng">
               <a:solidFill>
                 <a:srgbClr val="000000"/>
               </a:solidFill>
-            </a:endParaRPr>
-          </a:p>
-        </p:txBody>
-      </p:sp>
-      <p:pic>
-        <p:nvPicPr>
-          <p:cNvPr id="16" name="Picture 15"/>
-          <p:cNvPicPr>
-            <a:picLocks noChangeAspect="1"/>
-          </p:cNvPicPr>
-          <p:nvPr/>
-        </p:nvPicPr>
-        <p:blipFill>
-          <a:blip r:embed="rId2"/>
-          <a:stretch>
-            <a:fillRect/>
-          </a:stretch>
-        </p:blipFill>
-        <p:spPr>
-          <a:xfrm>
-            <a:off x="3807180" y="103013"/>
-            <a:ext cx="946187" cy="898878"/>
-          </a:xfrm>
-          <a:prstGeom prst="rect">
-            <a:avLst/>
-          </a:prstGeom>
-        </p:spPr>
-      </p:pic>
-      <p:cxnSp>
-        <p:nvCxnSpPr>
-          <p:cNvPr id="18" name="Straight Arrow Connector 17"/>
-          <p:cNvCxnSpPr/>
-          <p:nvPr/>
-        </p:nvCxnSpPr>
-        <p:spPr>
-          <a:xfrm>
-            <a:off x="4007559" y="1001891"/>
-            <a:ext cx="0" cy="888995"/>
-          </a:xfrm>
-          <a:prstGeom prst="straightConnector1">
-            <a:avLst/>
-          </a:prstGeom>
-          <a:ln w="38100" cmpd="sng">
+              <a:tailEnd type="arrow"/>
+            </a:ln>
+          </p:spPr>
+          <p:style>
+            <a:lnRef idx="2">
+              <a:schemeClr val="accent1"/>
+            </a:lnRef>
+            <a:fillRef idx="0">
+              <a:schemeClr val="accent1"/>
+            </a:fillRef>
+            <a:effectRef idx="1">
+              <a:schemeClr val="accent1"/>
+            </a:effectRef>
+            <a:fontRef idx="minor">
+              <a:schemeClr val="tx1"/>
+            </a:fontRef>
+          </p:style>
+        </p:cxnSp>
+        <p:sp>
+          <p:nvSpPr>
+            <p:cNvPr id="20" name="TextBox 19"/>
+            <p:cNvSpPr txBox="1"/>
+            <p:nvPr/>
+          </p:nvSpPr>
+          <p:spPr>
+            <a:xfrm>
+              <a:off x="2529596" y="1171222"/>
+              <a:ext cx="1509887" cy="369332"/>
+            </a:xfrm>
+            <a:prstGeom prst="rect">
+              <a:avLst/>
+            </a:prstGeom>
+            <a:noFill/>
+          </p:spPr>
+          <p:txBody>
+            <a:bodyPr wrap="square" rtlCol="0">
+              <a:spAutoFit/>
+            </a:bodyPr>
+            <a:lstStyle/>
+            <a:p>
+              <a:pPr algn="ctr"/>
+              <a:r>
+                <a:rPr lang="en-US" dirty="0" smtClean="0"/>
+                <a:t>Computation</a:t>
+              </a:r>
+              <a:endParaRPr lang="en-US" dirty="0"/>
+            </a:p>
+          </p:txBody>
+        </p:sp>
+        <p:sp>
+          <p:nvSpPr>
+            <p:cNvPr id="21" name="TextBox 20"/>
+            <p:cNvSpPr txBox="1"/>
+            <p:nvPr/>
+          </p:nvSpPr>
+          <p:spPr>
+            <a:xfrm>
+              <a:off x="4456293" y="1052166"/>
+              <a:ext cx="1967122" cy="646331"/>
+            </a:xfrm>
+            <a:prstGeom prst="rect">
+              <a:avLst/>
+            </a:prstGeom>
+            <a:noFill/>
+          </p:spPr>
+          <p:txBody>
+            <a:bodyPr wrap="square" rtlCol="0">
+              <a:spAutoFit/>
+            </a:bodyPr>
+            <a:lstStyle/>
+            <a:p>
+              <a:pPr algn="ctr"/>
+              <a:r>
+                <a:rPr lang="en-US" dirty="0" smtClean="0"/>
+                <a:t>Differentially Private Answer</a:t>
+              </a:r>
+              <a:endParaRPr lang="en-US" dirty="0"/>
+            </a:p>
+          </p:txBody>
+        </p:sp>
+        <p:cxnSp>
+          <p:nvCxnSpPr>
+            <p:cNvPr id="23" name="Elbow Connector 22"/>
+            <p:cNvCxnSpPr/>
+            <p:nvPr/>
+          </p:nvCxnSpPr>
+          <p:spPr>
+            <a:xfrm rot="16200000" flipH="1">
+              <a:off x="4000508" y="2293049"/>
+              <a:ext cx="578556" cy="564455"/>
+            </a:xfrm>
+            <a:prstGeom prst="bentConnector3">
+              <a:avLst>
+                <a:gd name="adj1" fmla="val 98781"/>
+              </a:avLst>
+            </a:prstGeom>
+            <a:ln w="38100" cmpd="sng">
+              <a:solidFill>
+                <a:srgbClr val="000000"/>
+              </a:solidFill>
+              <a:tailEnd type="arrow"/>
+            </a:ln>
+          </p:spPr>
+          <p:style>
+            <a:lnRef idx="2">
+              <a:schemeClr val="accent1"/>
+            </a:lnRef>
+            <a:fillRef idx="0">
+              <a:schemeClr val="accent1"/>
+            </a:fillRef>
+            <a:effectRef idx="1">
+              <a:schemeClr val="accent1"/>
+            </a:effectRef>
+            <a:fontRef idx="minor">
+              <a:schemeClr val="tx1"/>
+            </a:fontRef>
+          </p:style>
+        </p:cxnSp>
+        <p:cxnSp>
+          <p:nvCxnSpPr>
+            <p:cNvPr id="25" name="Straight Arrow Connector 24"/>
+            <p:cNvCxnSpPr>
+              <a:stCxn id="5" idx="3"/>
+              <a:endCxn id="13" idx="1"/>
+            </p:cNvCxnSpPr>
+            <p:nvPr/>
+          </p:nvCxnSpPr>
+          <p:spPr>
+            <a:xfrm>
+              <a:off x="3697112" y="3231444"/>
+              <a:ext cx="874900" cy="12700"/>
+            </a:xfrm>
+            <a:prstGeom prst="curvedConnector3">
+              <a:avLst/>
+            </a:prstGeom>
+            <a:ln w="38100" cmpd="sng">
+              <a:solidFill>
+                <a:srgbClr val="000000"/>
+              </a:solidFill>
+              <a:headEnd type="arrow"/>
+              <a:tailEnd type="arrow"/>
+            </a:ln>
+          </p:spPr>
+          <p:style>
+            <a:lnRef idx="2">
+              <a:schemeClr val="accent1"/>
+            </a:lnRef>
+            <a:fillRef idx="0">
+              <a:schemeClr val="accent1"/>
+            </a:fillRef>
+            <a:effectRef idx="1">
+              <a:schemeClr val="accent1"/>
+            </a:effectRef>
+            <a:fontRef idx="minor">
+              <a:schemeClr val="tx1"/>
+            </a:fontRef>
+          </p:style>
+        </p:cxnSp>
+        <p:cxnSp>
+          <p:nvCxnSpPr>
+            <p:cNvPr id="34" name="Straight Arrow Connector 33"/>
+            <p:cNvCxnSpPr/>
+            <p:nvPr/>
+          </p:nvCxnSpPr>
+          <p:spPr>
+            <a:xfrm flipH="1">
+              <a:off x="3457226" y="3889065"/>
+              <a:ext cx="1735668" cy="809935"/>
+            </a:xfrm>
+            <a:prstGeom prst="straightConnector1">
+              <a:avLst/>
+            </a:prstGeom>
+            <a:ln w="28575" cmpd="sng">
+              <a:solidFill>
+                <a:srgbClr val="000000"/>
+              </a:solidFill>
+              <a:prstDash val="dot"/>
+              <a:headEnd type="arrow"/>
+              <a:tailEnd type="arrow"/>
+            </a:ln>
+          </p:spPr>
+          <p:style>
+            <a:lnRef idx="2">
+              <a:schemeClr val="accent1"/>
+            </a:lnRef>
+            <a:fillRef idx="0">
+              <a:schemeClr val="accent1"/>
+            </a:fillRef>
+            <a:effectRef idx="1">
+              <a:schemeClr val="accent1"/>
+            </a:effectRef>
+            <a:fontRef idx="minor">
+              <a:schemeClr val="tx1"/>
+            </a:fontRef>
+          </p:style>
+        </p:cxnSp>
+        <p:cxnSp>
+          <p:nvCxnSpPr>
+            <p:cNvPr id="35" name="Straight Arrow Connector 34"/>
+            <p:cNvCxnSpPr>
+              <a:endCxn id="10" idx="0"/>
+            </p:cNvCxnSpPr>
+            <p:nvPr/>
+          </p:nvCxnSpPr>
+          <p:spPr>
+            <a:xfrm flipH="1">
+              <a:off x="4159961" y="3889065"/>
+              <a:ext cx="1312333" cy="1190935"/>
+            </a:xfrm>
+            <a:prstGeom prst="straightConnector1">
+              <a:avLst/>
+            </a:prstGeom>
+            <a:ln w="28575" cmpd="sng">
+              <a:solidFill>
+                <a:srgbClr val="000000"/>
+              </a:solidFill>
+              <a:prstDash val="dot"/>
+              <a:headEnd type="arrow"/>
+              <a:tailEnd type="arrow"/>
+            </a:ln>
+          </p:spPr>
+          <p:style>
+            <a:lnRef idx="2">
+              <a:schemeClr val="accent1"/>
+            </a:lnRef>
+            <a:fillRef idx="0">
+              <a:schemeClr val="accent1"/>
+            </a:fillRef>
+            <a:effectRef idx="1">
+              <a:schemeClr val="accent1"/>
+            </a:effectRef>
+            <a:fontRef idx="minor">
+              <a:schemeClr val="tx1"/>
+            </a:fontRef>
+          </p:style>
+        </p:cxnSp>
+        <p:cxnSp>
+          <p:nvCxnSpPr>
+            <p:cNvPr id="38" name="Straight Arrow Connector 37"/>
+            <p:cNvCxnSpPr>
+              <a:endCxn id="11" idx="0"/>
+            </p:cNvCxnSpPr>
+            <p:nvPr/>
+          </p:nvCxnSpPr>
+          <p:spPr>
+            <a:xfrm flipH="1">
+              <a:off x="5472294" y="3889065"/>
+              <a:ext cx="98778" cy="1190935"/>
+            </a:xfrm>
+            <a:prstGeom prst="straightConnector1">
+              <a:avLst/>
+            </a:prstGeom>
+            <a:ln w="28575" cmpd="sng">
+              <a:solidFill>
+                <a:srgbClr val="000000"/>
+              </a:solidFill>
+              <a:prstDash val="dot"/>
+              <a:headEnd type="arrow"/>
+              <a:tailEnd type="arrow"/>
+            </a:ln>
+          </p:spPr>
+          <p:style>
+            <a:lnRef idx="2">
+              <a:schemeClr val="accent1"/>
+            </a:lnRef>
+            <a:fillRef idx="0">
+              <a:schemeClr val="accent1"/>
+            </a:fillRef>
+            <a:effectRef idx="1">
+              <a:schemeClr val="accent1"/>
+            </a:effectRef>
+            <a:fontRef idx="minor">
+              <a:schemeClr val="tx1"/>
+            </a:fontRef>
+          </p:style>
+        </p:cxnSp>
+        <p:cxnSp>
+          <p:nvCxnSpPr>
+            <p:cNvPr id="41" name="Straight Arrow Connector 40"/>
+            <p:cNvCxnSpPr>
+              <a:endCxn id="12" idx="0"/>
+            </p:cNvCxnSpPr>
+            <p:nvPr/>
+          </p:nvCxnSpPr>
+          <p:spPr>
+            <a:xfrm>
+              <a:off x="5700894" y="3889065"/>
+              <a:ext cx="1100666" cy="1190935"/>
+            </a:xfrm>
+            <a:prstGeom prst="straightConnector1">
+              <a:avLst/>
+            </a:prstGeom>
+            <a:ln w="28575" cmpd="sng">
+              <a:solidFill>
+                <a:srgbClr val="000000"/>
+              </a:solidFill>
+              <a:prstDash val="dot"/>
+              <a:headEnd type="arrow"/>
+              <a:tailEnd type="arrow"/>
+            </a:ln>
+          </p:spPr>
+          <p:style>
+            <a:lnRef idx="2">
+              <a:schemeClr val="accent1"/>
+            </a:lnRef>
+            <a:fillRef idx="0">
+              <a:schemeClr val="accent1"/>
+            </a:fillRef>
+            <a:effectRef idx="1">
+              <a:schemeClr val="accent1"/>
+            </a:effectRef>
+            <a:fontRef idx="minor">
+              <a:schemeClr val="tx1"/>
+            </a:fontRef>
+          </p:style>
+        </p:cxnSp>
+        <p:sp>
+          <p:nvSpPr>
+            <p:cNvPr id="57" name="Rounded Rectangle 56"/>
+            <p:cNvSpPr/>
+            <p:nvPr/>
+          </p:nvSpPr>
+          <p:spPr>
+            <a:xfrm>
+              <a:off x="7055558" y="2439811"/>
+              <a:ext cx="1284112" cy="550335"/>
+            </a:xfrm>
+            <a:prstGeom prst="roundRect">
+              <a:avLst/>
+            </a:prstGeom>
             <a:solidFill>
-              <a:srgbClr val="000000"/>
+              <a:srgbClr val="4F81BD"/>
             </a:solidFill>
-            <a:tailEnd type="arrow"/>
-          </a:ln>
-        </p:spPr>
-        <p:style>
-          <a:lnRef idx="2">
-            <a:schemeClr val="accent1"/>
-          </a:lnRef>
-          <a:fillRef idx="0">
-            <a:schemeClr val="accent1"/>
-          </a:fillRef>
-          <a:effectRef idx="1">
-            <a:schemeClr val="accent1"/>
-          </a:effectRef>
-          <a:fontRef idx="minor">
-            <a:schemeClr val="tx1"/>
-          </a:fontRef>
-        </p:style>
-      </p:cxnSp>
-      <p:cxnSp>
-        <p:nvCxnSpPr>
-          <p:cNvPr id="19" name="Straight Arrow Connector 18"/>
-          <p:cNvCxnSpPr/>
-          <p:nvPr/>
-        </p:nvCxnSpPr>
-        <p:spPr>
-          <a:xfrm flipV="1">
-            <a:off x="4456293" y="1001891"/>
-            <a:ext cx="0" cy="888995"/>
-          </a:xfrm>
-          <a:prstGeom prst="straightConnector1">
-            <a:avLst/>
-          </a:prstGeom>
-          <a:ln w="38100" cmpd="sng">
+          </p:spPr>
+          <p:style>
+            <a:lnRef idx="1">
+              <a:schemeClr val="accent1"/>
+            </a:lnRef>
+            <a:fillRef idx="3">
+              <a:schemeClr val="accent1"/>
+            </a:fillRef>
+            <a:effectRef idx="2">
+              <a:schemeClr val="accent1"/>
+            </a:effectRef>
+            <a:fontRef idx="minor">
+              <a:schemeClr val="lt1"/>
+            </a:fontRef>
+          </p:style>
+          <p:txBody>
+            <a:bodyPr rtlCol="0" anchor="ctr"/>
+            <a:lstStyle/>
+            <a:p>
+              <a:pPr algn="ctr"/>
+              <a:r>
+                <a:rPr lang="en-US" b="1" dirty="0" smtClean="0"/>
+                <a:t>Noise Generator</a:t>
+              </a:r>
+              <a:endParaRPr lang="en-US" b="1" dirty="0"/>
+            </a:p>
+          </p:txBody>
+        </p:sp>
+        <p:cxnSp>
+          <p:nvCxnSpPr>
+            <p:cNvPr id="62" name="Straight Arrow Connector 24"/>
+            <p:cNvCxnSpPr/>
+            <p:nvPr/>
+          </p:nvCxnSpPr>
+          <p:spPr>
+            <a:xfrm>
+              <a:off x="6547567" y="2864555"/>
+              <a:ext cx="507991" cy="12700"/>
+            </a:xfrm>
+            <a:prstGeom prst="curvedConnector3">
+              <a:avLst/>
+            </a:prstGeom>
+            <a:ln w="38100" cmpd="sng">
+              <a:solidFill>
+                <a:srgbClr val="000000"/>
+              </a:solidFill>
+              <a:headEnd type="arrow"/>
+              <a:tailEnd type="arrow"/>
+            </a:ln>
+          </p:spPr>
+          <p:style>
+            <a:lnRef idx="2">
+              <a:schemeClr val="accent1"/>
+            </a:lnRef>
+            <a:fillRef idx="0">
+              <a:schemeClr val="accent1"/>
+            </a:fillRef>
+            <a:effectRef idx="1">
+              <a:schemeClr val="accent1"/>
+            </a:effectRef>
+            <a:fontRef idx="minor">
+              <a:schemeClr val="tx1"/>
+            </a:fontRef>
+          </p:style>
+        </p:cxnSp>
+        <p:cxnSp>
+          <p:nvCxnSpPr>
+            <p:cNvPr id="65" name="Straight Arrow Connector 64"/>
+            <p:cNvCxnSpPr/>
+            <p:nvPr/>
+          </p:nvCxnSpPr>
+          <p:spPr>
+            <a:xfrm flipH="1">
+              <a:off x="6568730" y="3678785"/>
+              <a:ext cx="1770940" cy="0"/>
+            </a:xfrm>
+            <a:prstGeom prst="straightConnector1">
+              <a:avLst/>
+            </a:prstGeom>
+            <a:ln w="38100" cmpd="sng">
+              <a:solidFill>
+                <a:srgbClr val="000000"/>
+              </a:solidFill>
+              <a:tailEnd type="arrow"/>
+            </a:ln>
+          </p:spPr>
+          <p:style>
+            <a:lnRef idx="2">
+              <a:schemeClr val="accent1"/>
+            </a:lnRef>
+            <a:fillRef idx="0">
+              <a:schemeClr val="accent1"/>
+            </a:fillRef>
+            <a:effectRef idx="1">
+              <a:schemeClr val="accent1"/>
+            </a:effectRef>
+            <a:fontRef idx="minor">
+              <a:schemeClr val="tx1"/>
+            </a:fontRef>
+          </p:style>
+        </p:cxnSp>
+        <p:sp>
+          <p:nvSpPr>
+            <p:cNvPr id="66" name="TextBox 65"/>
+            <p:cNvSpPr txBox="1"/>
+            <p:nvPr/>
+          </p:nvSpPr>
+          <p:spPr>
+            <a:xfrm>
+              <a:off x="6519338" y="3707007"/>
+              <a:ext cx="2328331" cy="646331"/>
+            </a:xfrm>
+            <a:prstGeom prst="rect">
+              <a:avLst/>
+            </a:prstGeom>
+            <a:noFill/>
+          </p:spPr>
+          <p:txBody>
+            <a:bodyPr wrap="square" rtlCol="0">
+              <a:spAutoFit/>
+            </a:bodyPr>
+            <a:lstStyle/>
+            <a:p>
+              <a:r>
+                <a:rPr lang="en-US" dirty="0" smtClean="0"/>
+                <a:t>1. Computation</a:t>
+              </a:r>
+              <a:br>
+                <a:rPr lang="en-US" dirty="0" smtClean="0"/>
+              </a:br>
+              <a:r>
+                <a:rPr lang="en-US" dirty="0" smtClean="0"/>
+                <a:t>2. </a:t>
+              </a:r>
+              <a:r>
+                <a:rPr lang="en-US" i="1" dirty="0" smtClean="0"/>
+                <a:t>[Bounds Estimator]</a:t>
+              </a:r>
+              <a:endParaRPr lang="en-US" i="1" dirty="0"/>
+            </a:p>
+          </p:txBody>
+        </p:sp>
+        <p:sp>
+          <p:nvSpPr>
+            <p:cNvPr id="71" name="Rounded Rectangle 70"/>
+            <p:cNvSpPr/>
+            <p:nvPr/>
+          </p:nvSpPr>
+          <p:spPr>
+            <a:xfrm>
+              <a:off x="7055555" y="3148185"/>
+              <a:ext cx="1284112" cy="355602"/>
+            </a:xfrm>
+            <a:prstGeom prst="roundRect">
+              <a:avLst/>
+            </a:prstGeom>
             <a:solidFill>
-              <a:srgbClr val="000000"/>
+              <a:srgbClr val="4F81BD"/>
             </a:solidFill>
-            <a:tailEnd type="arrow"/>
-          </a:ln>
-        </p:spPr>
-        <p:style>
-          <a:lnRef idx="2">
-            <a:schemeClr val="accent1"/>
-          </a:lnRef>
-          <a:fillRef idx="0">
-            <a:schemeClr val="accent1"/>
-          </a:fillRef>
-          <a:effectRef idx="1">
-            <a:schemeClr val="accent1"/>
-          </a:effectRef>
-          <a:fontRef idx="minor">
-            <a:schemeClr val="tx1"/>
-          </a:fontRef>
-        </p:style>
-      </p:cxnSp>
-      <p:sp>
-        <p:nvSpPr>
-          <p:cNvPr id="20" name="TextBox 19"/>
-          <p:cNvSpPr txBox="1"/>
-          <p:nvPr/>
-        </p:nvSpPr>
-        <p:spPr>
-          <a:xfrm>
-            <a:off x="2575281" y="1171222"/>
-            <a:ext cx="1509887" cy="369332"/>
-          </a:xfrm>
-          <a:prstGeom prst="rect">
-            <a:avLst/>
-          </a:prstGeom>
-          <a:noFill/>
-        </p:spPr>
-        <p:txBody>
-          <a:bodyPr wrap="square" rtlCol="0">
-            <a:spAutoFit/>
-          </a:bodyPr>
-          <a:lstStyle/>
-          <a:p>
-            <a:r>
-              <a:rPr lang="en-US" dirty="0" smtClean="0"/>
-              <a:t>Computation</a:t>
-            </a:r>
-            <a:endParaRPr lang="en-US" dirty="0"/>
-          </a:p>
-        </p:txBody>
-      </p:sp>
-      <p:sp>
-        <p:nvSpPr>
-          <p:cNvPr id="21" name="TextBox 20"/>
-          <p:cNvSpPr txBox="1"/>
-          <p:nvPr/>
-        </p:nvSpPr>
-        <p:spPr>
-          <a:xfrm>
-            <a:off x="4456293" y="1097846"/>
-            <a:ext cx="1667933" cy="646331"/>
-          </a:xfrm>
-          <a:prstGeom prst="rect">
-            <a:avLst/>
-          </a:prstGeom>
-          <a:noFill/>
-        </p:spPr>
-        <p:txBody>
-          <a:bodyPr wrap="square" rtlCol="0">
-            <a:spAutoFit/>
-          </a:bodyPr>
-          <a:lstStyle/>
-          <a:p>
-            <a:r>
-              <a:rPr lang="en-US" dirty="0" smtClean="0"/>
-              <a:t>Differentially Private Answer</a:t>
-            </a:r>
-            <a:endParaRPr lang="en-US" dirty="0"/>
-          </a:p>
-        </p:txBody>
-      </p:sp>
-      <p:cxnSp>
-        <p:nvCxnSpPr>
-          <p:cNvPr id="23" name="Elbow Connector 22"/>
-          <p:cNvCxnSpPr/>
-          <p:nvPr/>
-        </p:nvCxnSpPr>
-        <p:spPr>
-          <a:xfrm rot="16200000" flipH="1">
-            <a:off x="4000508" y="2293049"/>
-            <a:ext cx="578556" cy="564455"/>
-          </a:xfrm>
-          <a:prstGeom prst="bentConnector3">
-            <a:avLst>
-              <a:gd name="adj1" fmla="val 98781"/>
-            </a:avLst>
-          </a:prstGeom>
-          <a:ln w="38100" cmpd="sng">
-            <a:solidFill>
-              <a:srgbClr val="000000"/>
-            </a:solidFill>
-            <a:tailEnd type="arrow"/>
-          </a:ln>
-        </p:spPr>
-        <p:style>
-          <a:lnRef idx="2">
-            <a:schemeClr val="accent1"/>
-          </a:lnRef>
-          <a:fillRef idx="0">
-            <a:schemeClr val="accent1"/>
-          </a:fillRef>
-          <a:effectRef idx="1">
-            <a:schemeClr val="accent1"/>
-          </a:effectRef>
-          <a:fontRef idx="minor">
-            <a:schemeClr val="tx1"/>
-          </a:fontRef>
-        </p:style>
-      </p:cxnSp>
-      <p:cxnSp>
-        <p:nvCxnSpPr>
-          <p:cNvPr id="25" name="Straight Arrow Connector 24"/>
-          <p:cNvCxnSpPr>
-            <a:stCxn id="5" idx="3"/>
-            <a:endCxn id="13" idx="1"/>
-          </p:cNvCxnSpPr>
-          <p:nvPr/>
-        </p:nvCxnSpPr>
-        <p:spPr>
-          <a:xfrm>
-            <a:off x="3697112" y="3231444"/>
-            <a:ext cx="874900" cy="12700"/>
-          </a:xfrm>
-          <a:prstGeom prst="curvedConnector3">
-            <a:avLst/>
-          </a:prstGeom>
-          <a:ln w="38100" cmpd="sng">
-            <a:solidFill>
-              <a:srgbClr val="000000"/>
-            </a:solidFill>
-            <a:headEnd type="arrow"/>
-            <a:tailEnd type="arrow"/>
-          </a:ln>
-        </p:spPr>
-        <p:style>
-          <a:lnRef idx="2">
-            <a:schemeClr val="accent1"/>
-          </a:lnRef>
-          <a:fillRef idx="0">
-            <a:schemeClr val="accent1"/>
-          </a:fillRef>
-          <a:effectRef idx="1">
-            <a:schemeClr val="accent1"/>
-          </a:effectRef>
-          <a:fontRef idx="minor">
-            <a:schemeClr val="tx1"/>
-          </a:fontRef>
-        </p:style>
-      </p:cxnSp>
-      <p:cxnSp>
-        <p:nvCxnSpPr>
-          <p:cNvPr id="34" name="Straight Arrow Connector 33"/>
-          <p:cNvCxnSpPr/>
-          <p:nvPr/>
-        </p:nvCxnSpPr>
-        <p:spPr>
-          <a:xfrm flipH="1">
-            <a:off x="3457226" y="3889065"/>
-            <a:ext cx="1735668" cy="809935"/>
-          </a:xfrm>
-          <a:prstGeom prst="straightConnector1">
-            <a:avLst/>
-          </a:prstGeom>
-          <a:ln w="28575" cmpd="sng">
-            <a:solidFill>
-              <a:srgbClr val="000000"/>
-            </a:solidFill>
-            <a:prstDash val="dot"/>
-            <a:headEnd type="arrow"/>
-            <a:tailEnd type="arrow"/>
-          </a:ln>
-        </p:spPr>
-        <p:style>
-          <a:lnRef idx="2">
-            <a:schemeClr val="accent1"/>
-          </a:lnRef>
-          <a:fillRef idx="0">
-            <a:schemeClr val="accent1"/>
-          </a:fillRef>
-          <a:effectRef idx="1">
-            <a:schemeClr val="accent1"/>
-          </a:effectRef>
-          <a:fontRef idx="minor">
-            <a:schemeClr val="tx1"/>
-          </a:fontRef>
-        </p:style>
-      </p:cxnSp>
-      <p:cxnSp>
-        <p:nvCxnSpPr>
-          <p:cNvPr id="35" name="Straight Arrow Connector 34"/>
-          <p:cNvCxnSpPr>
-            <a:endCxn id="10" idx="0"/>
-          </p:cNvCxnSpPr>
-          <p:nvPr/>
-        </p:nvCxnSpPr>
-        <p:spPr>
-          <a:xfrm flipH="1">
-            <a:off x="4159961" y="3889065"/>
-            <a:ext cx="1312333" cy="1190935"/>
-          </a:xfrm>
-          <a:prstGeom prst="straightConnector1">
-            <a:avLst/>
-          </a:prstGeom>
-          <a:ln w="28575" cmpd="sng">
-            <a:solidFill>
-              <a:srgbClr val="000000"/>
-            </a:solidFill>
-            <a:prstDash val="dot"/>
-            <a:headEnd type="arrow"/>
-            <a:tailEnd type="arrow"/>
-          </a:ln>
-        </p:spPr>
-        <p:style>
-          <a:lnRef idx="2">
-            <a:schemeClr val="accent1"/>
-          </a:lnRef>
-          <a:fillRef idx="0">
-            <a:schemeClr val="accent1"/>
-          </a:fillRef>
-          <a:effectRef idx="1">
-            <a:schemeClr val="accent1"/>
-          </a:effectRef>
-          <a:fontRef idx="minor">
-            <a:schemeClr val="tx1"/>
-          </a:fontRef>
-        </p:style>
-      </p:cxnSp>
-      <p:cxnSp>
-        <p:nvCxnSpPr>
-          <p:cNvPr id="38" name="Straight Arrow Connector 37"/>
-          <p:cNvCxnSpPr>
-            <a:endCxn id="11" idx="0"/>
-          </p:cNvCxnSpPr>
-          <p:nvPr/>
-        </p:nvCxnSpPr>
-        <p:spPr>
-          <a:xfrm flipH="1">
-            <a:off x="5472294" y="3889065"/>
-            <a:ext cx="98778" cy="1190935"/>
-          </a:xfrm>
-          <a:prstGeom prst="straightConnector1">
-            <a:avLst/>
-          </a:prstGeom>
-          <a:ln w="28575" cmpd="sng">
-            <a:solidFill>
-              <a:srgbClr val="000000"/>
-            </a:solidFill>
-            <a:prstDash val="dot"/>
-            <a:headEnd type="arrow"/>
-            <a:tailEnd type="arrow"/>
-          </a:ln>
-        </p:spPr>
-        <p:style>
-          <a:lnRef idx="2">
-            <a:schemeClr val="accent1"/>
-          </a:lnRef>
-          <a:fillRef idx="0">
-            <a:schemeClr val="accent1"/>
-          </a:fillRef>
-          <a:effectRef idx="1">
-            <a:schemeClr val="accent1"/>
-          </a:effectRef>
-          <a:fontRef idx="minor">
-            <a:schemeClr val="tx1"/>
-          </a:fontRef>
-        </p:style>
-      </p:cxnSp>
-      <p:cxnSp>
-        <p:nvCxnSpPr>
-          <p:cNvPr id="41" name="Straight Arrow Connector 40"/>
-          <p:cNvCxnSpPr>
-            <a:endCxn id="12" idx="0"/>
-          </p:cNvCxnSpPr>
-          <p:nvPr/>
-        </p:nvCxnSpPr>
-        <p:spPr>
-          <a:xfrm>
-            <a:off x="5700894" y="3889065"/>
-            <a:ext cx="1100666" cy="1190935"/>
-          </a:xfrm>
-          <a:prstGeom prst="straightConnector1">
-            <a:avLst/>
-          </a:prstGeom>
-          <a:ln w="28575" cmpd="sng">
-            <a:solidFill>
-              <a:srgbClr val="000000"/>
-            </a:solidFill>
-            <a:prstDash val="dot"/>
-            <a:headEnd type="arrow"/>
-            <a:tailEnd type="arrow"/>
-          </a:ln>
-        </p:spPr>
-        <p:style>
-          <a:lnRef idx="2">
-            <a:schemeClr val="accent1"/>
-          </a:lnRef>
-          <a:fillRef idx="0">
-            <a:schemeClr val="accent1"/>
-          </a:fillRef>
-          <a:effectRef idx="1">
-            <a:schemeClr val="accent1"/>
-          </a:effectRef>
-          <a:fontRef idx="minor">
-            <a:schemeClr val="tx1"/>
-          </a:fontRef>
-        </p:style>
-      </p:cxnSp>
-      <p:sp>
-        <p:nvSpPr>
-          <p:cNvPr id="57" name="Rounded Rectangle 56"/>
-          <p:cNvSpPr/>
-          <p:nvPr/>
-        </p:nvSpPr>
-        <p:spPr>
-          <a:xfrm>
-            <a:off x="7055558" y="2439811"/>
-            <a:ext cx="1284112" cy="550335"/>
-          </a:xfrm>
-          <a:prstGeom prst="roundRect">
-            <a:avLst/>
-          </a:prstGeom>
-        </p:spPr>
-        <p:style>
-          <a:lnRef idx="1">
-            <a:schemeClr val="accent1"/>
-          </a:lnRef>
-          <a:fillRef idx="3">
-            <a:schemeClr val="accent1"/>
-          </a:fillRef>
-          <a:effectRef idx="2">
-            <a:schemeClr val="accent1"/>
-          </a:effectRef>
-          <a:fontRef idx="minor">
-            <a:schemeClr val="lt1"/>
-          </a:fontRef>
-        </p:style>
-        <p:txBody>
-          <a:bodyPr rtlCol="0" anchor="ctr"/>
-          <a:lstStyle/>
-          <a:p>
-            <a:pPr algn="ctr"/>
-            <a:r>
-              <a:rPr lang="en-US" dirty="0" smtClean="0"/>
-              <a:t>Noise Generator</a:t>
-            </a:r>
-            <a:endParaRPr lang="en-US" dirty="0"/>
-          </a:p>
-        </p:txBody>
-      </p:sp>
-      <p:cxnSp>
-        <p:nvCxnSpPr>
-          <p:cNvPr id="62" name="Straight Arrow Connector 24"/>
-          <p:cNvCxnSpPr/>
-          <p:nvPr/>
-        </p:nvCxnSpPr>
-        <p:spPr>
-          <a:xfrm>
-            <a:off x="6547567" y="2864555"/>
-            <a:ext cx="507991" cy="12700"/>
-          </a:xfrm>
-          <a:prstGeom prst="curvedConnector3">
-            <a:avLst/>
-          </a:prstGeom>
-          <a:ln w="38100" cmpd="sng">
-            <a:solidFill>
-              <a:srgbClr val="000000"/>
-            </a:solidFill>
-            <a:headEnd type="arrow"/>
-            <a:tailEnd type="arrow"/>
-          </a:ln>
-        </p:spPr>
-        <p:style>
-          <a:lnRef idx="2">
-            <a:schemeClr val="accent1"/>
-          </a:lnRef>
-          <a:fillRef idx="0">
-            <a:schemeClr val="accent1"/>
-          </a:fillRef>
-          <a:effectRef idx="1">
-            <a:schemeClr val="accent1"/>
-          </a:effectRef>
-          <a:fontRef idx="minor">
-            <a:schemeClr val="tx1"/>
-          </a:fontRef>
-        </p:style>
-      </p:cxnSp>
-      <p:cxnSp>
-        <p:nvCxnSpPr>
-          <p:cNvPr id="65" name="Straight Arrow Connector 64"/>
-          <p:cNvCxnSpPr/>
-          <p:nvPr/>
-        </p:nvCxnSpPr>
-        <p:spPr>
-          <a:xfrm flipH="1">
-            <a:off x="6568730" y="3678785"/>
-            <a:ext cx="1770940" cy="0"/>
-          </a:xfrm>
-          <a:prstGeom prst="straightConnector1">
-            <a:avLst/>
-          </a:prstGeom>
-          <a:ln w="38100" cmpd="sng">
-            <a:solidFill>
-              <a:srgbClr val="000000"/>
-            </a:solidFill>
-            <a:tailEnd type="arrow"/>
-          </a:ln>
-        </p:spPr>
-        <p:style>
-          <a:lnRef idx="2">
-            <a:schemeClr val="accent1"/>
-          </a:lnRef>
-          <a:fillRef idx="0">
-            <a:schemeClr val="accent1"/>
-          </a:fillRef>
-          <a:effectRef idx="1">
-            <a:schemeClr val="accent1"/>
-          </a:effectRef>
-          <a:fontRef idx="minor">
-            <a:schemeClr val="tx1"/>
-          </a:fontRef>
-        </p:style>
-      </p:cxnSp>
-      <p:sp>
-        <p:nvSpPr>
-          <p:cNvPr id="66" name="TextBox 65"/>
-          <p:cNvSpPr txBox="1"/>
-          <p:nvPr/>
-        </p:nvSpPr>
-        <p:spPr>
-          <a:xfrm>
-            <a:off x="6519338" y="3707007"/>
-            <a:ext cx="2328331" cy="646331"/>
-          </a:xfrm>
-          <a:prstGeom prst="rect">
-            <a:avLst/>
-          </a:prstGeom>
-          <a:noFill/>
-        </p:spPr>
-        <p:txBody>
-          <a:bodyPr wrap="square" rtlCol="0">
-            <a:spAutoFit/>
-          </a:bodyPr>
-          <a:lstStyle/>
-          <a:p>
-            <a:r>
-              <a:rPr lang="en-US" dirty="0" smtClean="0"/>
-              <a:t>1. Computation</a:t>
-            </a:r>
-            <a:br>
-              <a:rPr lang="en-US" dirty="0" smtClean="0"/>
-            </a:br>
-            <a:r>
-              <a:rPr lang="en-US" dirty="0" smtClean="0"/>
-              <a:t>2. </a:t>
-            </a:r>
-            <a:r>
-              <a:rPr lang="en-US" i="1" dirty="0" smtClean="0"/>
-              <a:t>[Bounds Estimator]</a:t>
-            </a:r>
-            <a:endParaRPr lang="en-US" i="1" dirty="0"/>
-          </a:p>
-        </p:txBody>
-      </p:sp>
-      <p:sp>
-        <p:nvSpPr>
-          <p:cNvPr id="71" name="Rounded Rectangle 70"/>
-          <p:cNvSpPr/>
-          <p:nvPr/>
-        </p:nvSpPr>
-        <p:spPr>
-          <a:xfrm>
-            <a:off x="7055555" y="3148185"/>
-            <a:ext cx="1284112" cy="355602"/>
-          </a:xfrm>
-          <a:prstGeom prst="roundRect">
-            <a:avLst/>
-          </a:prstGeom>
-        </p:spPr>
-        <p:style>
-          <a:lnRef idx="1">
-            <a:schemeClr val="accent1"/>
-          </a:lnRef>
-          <a:fillRef idx="3">
-            <a:schemeClr val="accent1"/>
-          </a:fillRef>
-          <a:effectRef idx="2">
-            <a:schemeClr val="accent1"/>
-          </a:effectRef>
-          <a:fontRef idx="minor">
-            <a:schemeClr val="lt1"/>
-          </a:fontRef>
-        </p:style>
-        <p:txBody>
-          <a:bodyPr rtlCol="0" anchor="ctr"/>
-          <a:lstStyle/>
-          <a:p>
-            <a:pPr algn="ctr"/>
-            <a:r>
-              <a:rPr lang="en-US" dirty="0" smtClean="0"/>
-              <a:t>Auditing</a:t>
-            </a:r>
-            <a:endParaRPr lang="en-US" dirty="0"/>
-          </a:p>
-        </p:txBody>
-      </p:sp>
-      <p:cxnSp>
-        <p:nvCxnSpPr>
-          <p:cNvPr id="72" name="Straight Arrow Connector 24"/>
-          <p:cNvCxnSpPr/>
-          <p:nvPr/>
-        </p:nvCxnSpPr>
-        <p:spPr>
-          <a:xfrm>
-            <a:off x="6547564" y="3313286"/>
-            <a:ext cx="507991" cy="12700"/>
-          </a:xfrm>
-          <a:prstGeom prst="curvedConnector3">
-            <a:avLst/>
-          </a:prstGeom>
-          <a:ln w="38100" cmpd="sng">
-            <a:solidFill>
-              <a:srgbClr val="000000"/>
-            </a:solidFill>
-            <a:headEnd type="arrow"/>
-            <a:tailEnd type="arrow"/>
-          </a:ln>
-        </p:spPr>
-        <p:style>
-          <a:lnRef idx="2">
-            <a:schemeClr val="accent1"/>
-          </a:lnRef>
-          <a:fillRef idx="0">
-            <a:schemeClr val="accent1"/>
-          </a:fillRef>
-          <a:effectRef idx="1">
-            <a:schemeClr val="accent1"/>
-          </a:effectRef>
-          <a:fontRef idx="minor">
-            <a:schemeClr val="tx1"/>
-          </a:fontRef>
-        </p:style>
-      </p:cxnSp>
+          </p:spPr>
+          <p:style>
+            <a:lnRef idx="1">
+              <a:schemeClr val="accent1"/>
+            </a:lnRef>
+            <a:fillRef idx="3">
+              <a:schemeClr val="accent1"/>
+            </a:fillRef>
+            <a:effectRef idx="2">
+              <a:schemeClr val="accent1"/>
+            </a:effectRef>
+            <a:fontRef idx="minor">
+              <a:schemeClr val="lt1"/>
+            </a:fontRef>
+          </p:style>
+          <p:txBody>
+            <a:bodyPr rtlCol="0" anchor="ctr"/>
+            <a:lstStyle/>
+            <a:p>
+              <a:pPr algn="ctr"/>
+              <a:r>
+                <a:rPr lang="en-US" b="1" dirty="0" smtClean="0"/>
+                <a:t>Auditing</a:t>
+              </a:r>
+              <a:endParaRPr lang="en-US" b="1" dirty="0"/>
+            </a:p>
+          </p:txBody>
+        </p:sp>
+        <p:cxnSp>
+          <p:nvCxnSpPr>
+            <p:cNvPr id="72" name="Straight Arrow Connector 24"/>
+            <p:cNvCxnSpPr/>
+            <p:nvPr/>
+          </p:nvCxnSpPr>
+          <p:spPr>
+            <a:xfrm>
+              <a:off x="6547564" y="3313286"/>
+              <a:ext cx="507991" cy="12700"/>
+            </a:xfrm>
+            <a:prstGeom prst="curvedConnector3">
+              <a:avLst/>
+            </a:prstGeom>
+            <a:ln w="38100" cmpd="sng">
+              <a:solidFill>
+                <a:srgbClr val="000000"/>
+              </a:solidFill>
+              <a:headEnd type="arrow"/>
+              <a:tailEnd type="arrow"/>
+            </a:ln>
+          </p:spPr>
+          <p:style>
+            <a:lnRef idx="2">
+              <a:schemeClr val="accent1"/>
+            </a:lnRef>
+            <a:fillRef idx="0">
+              <a:schemeClr val="accent1"/>
+            </a:fillRef>
+            <a:effectRef idx="1">
+              <a:schemeClr val="accent1"/>
+            </a:effectRef>
+            <a:fontRef idx="minor">
+              <a:schemeClr val="tx1"/>
+            </a:fontRef>
+          </p:style>
+        </p:cxnSp>
+      </p:grpSp>
     </p:spTree>
     <p:extLst>
       <p:ext uri="{BB962C8B-B14F-4D97-AF65-F5344CB8AC3E}">
         <p14:creationId xmlns:p14="http://schemas.microsoft.com/office/powerpoint/2010/main" val="2060850580"/>
+      </p:ext>
+    </p:extLst>
+  </p:cSld>
+  <p:clrMapOvr>
+    <a:masterClrMapping/>
+  </p:clrMapOvr>
+</p:sld>
+</file>
+
+<file path=ppt/slides/slide2.xml><?xml version="1.0" encoding="utf-8"?>
+<p:sld xmlns:a="http://schemas.openxmlformats.org/drawingml/2006/main" xmlns:r="http://schemas.openxmlformats.org/officeDocument/2006/relationships" xmlns:p="http://schemas.openxmlformats.org/presentationml/2006/main">
+  <p:cSld>
+    <p:spTree>
+      <p:nvGrpSpPr>
+        <p:cNvPr id="1" name=""/>
+        <p:cNvGrpSpPr/>
+        <p:nvPr/>
+      </p:nvGrpSpPr>
+      <p:grpSpPr>
+        <a:xfrm>
+          <a:off x="0" y="0"/>
+          <a:ext cx="0" cy="0"/>
+          <a:chOff x="0" y="0"/>
+          <a:chExt cx="0" cy="0"/>
+        </a:xfrm>
+      </p:grpSpPr>
+      <p:grpSp>
+        <p:nvGrpSpPr>
+          <p:cNvPr id="20" name="Group 19"/>
+          <p:cNvGrpSpPr/>
+          <p:nvPr/>
+        </p:nvGrpSpPr>
+        <p:grpSpPr>
+          <a:xfrm>
+            <a:off x="1086556" y="475097"/>
+            <a:ext cx="5775441" cy="6028120"/>
+            <a:chOff x="1086556" y="475097"/>
+            <a:chExt cx="5775441" cy="6028120"/>
+          </a:xfrm>
+        </p:grpSpPr>
+        <p:sp>
+          <p:nvSpPr>
+            <p:cNvPr id="4" name="Rectangle 3"/>
+            <p:cNvSpPr/>
+            <p:nvPr/>
+          </p:nvSpPr>
+          <p:spPr>
+            <a:xfrm>
+              <a:off x="1086556" y="1848557"/>
+              <a:ext cx="3911463" cy="4654660"/>
+            </a:xfrm>
+            <a:prstGeom prst="rect">
+              <a:avLst/>
+            </a:prstGeom>
+            <a:solidFill>
+              <a:schemeClr val="bg1">
+                <a:lumMod val="85000"/>
+              </a:schemeClr>
+            </a:solidFill>
+            <a:ln w="38100" cmpd="sng">
+              <a:solidFill>
+                <a:schemeClr val="tx1"/>
+              </a:solidFill>
+            </a:ln>
+          </p:spPr>
+          <p:style>
+            <a:lnRef idx="1">
+              <a:schemeClr val="accent1"/>
+            </a:lnRef>
+            <a:fillRef idx="3">
+              <a:schemeClr val="accent1"/>
+            </a:fillRef>
+            <a:effectRef idx="2">
+              <a:schemeClr val="accent1"/>
+            </a:effectRef>
+            <a:fontRef idx="minor">
+              <a:schemeClr val="lt1"/>
+            </a:fontRef>
+          </p:style>
+          <p:txBody>
+            <a:bodyPr rtlCol="0" anchor="ctr"/>
+            <a:lstStyle/>
+            <a:p>
+              <a:pPr algn="ctr"/>
+              <a:endParaRPr lang="en-US"/>
+            </a:p>
+          </p:txBody>
+        </p:sp>
+        <p:sp>
+          <p:nvSpPr>
+            <p:cNvPr id="5" name="Rectangle 4"/>
+            <p:cNvSpPr/>
+            <p:nvPr/>
+          </p:nvSpPr>
+          <p:spPr>
+            <a:xfrm>
+              <a:off x="3033533" y="1982595"/>
+              <a:ext cx="1836568" cy="4001737"/>
+            </a:xfrm>
+            <a:prstGeom prst="rect">
+              <a:avLst/>
+            </a:prstGeom>
+            <a:solidFill>
+              <a:schemeClr val="bg1">
+                <a:lumMod val="85000"/>
+              </a:schemeClr>
+            </a:solidFill>
+            <a:ln w="38100" cmpd="sng">
+              <a:solidFill>
+                <a:schemeClr val="tx1"/>
+              </a:solidFill>
+            </a:ln>
+          </p:spPr>
+          <p:style>
+            <a:lnRef idx="1">
+              <a:schemeClr val="accent1"/>
+            </a:lnRef>
+            <a:fillRef idx="3">
+              <a:schemeClr val="accent1"/>
+            </a:fillRef>
+            <a:effectRef idx="2">
+              <a:schemeClr val="accent1"/>
+            </a:effectRef>
+            <a:fontRef idx="minor">
+              <a:schemeClr val="lt1"/>
+            </a:fontRef>
+          </p:style>
+          <p:txBody>
+            <a:bodyPr rtlCol="0" anchor="ctr"/>
+            <a:lstStyle/>
+            <a:p>
+              <a:pPr algn="ctr"/>
+              <a:endParaRPr lang="en-US"/>
+            </a:p>
+          </p:txBody>
+        </p:sp>
+        <p:sp>
+          <p:nvSpPr>
+            <p:cNvPr id="10" name="Rectangle 9"/>
+            <p:cNvSpPr/>
+            <p:nvPr/>
+          </p:nvSpPr>
+          <p:spPr>
+            <a:xfrm>
+              <a:off x="1196965" y="1982977"/>
+              <a:ext cx="1626413" cy="4001737"/>
+            </a:xfrm>
+            <a:prstGeom prst="rect">
+              <a:avLst/>
+            </a:prstGeom>
+            <a:solidFill>
+              <a:schemeClr val="bg1">
+                <a:lumMod val="85000"/>
+              </a:schemeClr>
+            </a:solidFill>
+            <a:ln w="38100" cmpd="sng">
+              <a:solidFill>
+                <a:schemeClr val="tx1"/>
+              </a:solidFill>
+            </a:ln>
+          </p:spPr>
+          <p:style>
+            <a:lnRef idx="1">
+              <a:schemeClr val="accent1"/>
+            </a:lnRef>
+            <a:fillRef idx="3">
+              <a:schemeClr val="accent1"/>
+            </a:fillRef>
+            <a:effectRef idx="2">
+              <a:schemeClr val="accent1"/>
+            </a:effectRef>
+            <a:fontRef idx="minor">
+              <a:schemeClr val="lt1"/>
+            </a:fontRef>
+          </p:style>
+          <p:txBody>
+            <a:bodyPr rtlCol="0" anchor="ctr"/>
+            <a:lstStyle/>
+            <a:p>
+              <a:pPr algn="ctr"/>
+              <a:endParaRPr lang="en-US"/>
+            </a:p>
+          </p:txBody>
+        </p:sp>
+        <p:sp>
+          <p:nvSpPr>
+            <p:cNvPr id="6" name="Rectangle 5"/>
+            <p:cNvSpPr/>
+            <p:nvPr/>
+          </p:nvSpPr>
+          <p:spPr>
+            <a:xfrm>
+              <a:off x="1413327" y="2156569"/>
+              <a:ext cx="1236446" cy="3246334"/>
+            </a:xfrm>
+            <a:prstGeom prst="rect">
+              <a:avLst/>
+            </a:prstGeom>
+            <a:solidFill>
+              <a:schemeClr val="accent1"/>
+            </a:solidFill>
+            <a:ln w="38100" cmpd="sng">
+              <a:solidFill>
+                <a:schemeClr val="tx1"/>
+              </a:solidFill>
+            </a:ln>
+          </p:spPr>
+          <p:style>
+            <a:lnRef idx="1">
+              <a:schemeClr val="accent1"/>
+            </a:lnRef>
+            <a:fillRef idx="3">
+              <a:schemeClr val="accent1"/>
+            </a:fillRef>
+            <a:effectRef idx="2">
+              <a:schemeClr val="accent1"/>
+            </a:effectRef>
+            <a:fontRef idx="minor">
+              <a:schemeClr val="lt1"/>
+            </a:fontRef>
+          </p:style>
+          <p:txBody>
+            <a:bodyPr rtlCol="0" anchor="ctr"/>
+            <a:lstStyle/>
+            <a:p>
+              <a:pPr algn="ctr"/>
+              <a:r>
+                <a:rPr lang="en-US" b="1" dirty="0" smtClean="0">
+                  <a:solidFill>
+                    <a:schemeClr val="bg1"/>
+                  </a:solidFill>
+                </a:rPr>
+                <a:t>Isolation and Access Control</a:t>
+              </a:r>
+              <a:endParaRPr lang="en-US" b="1" dirty="0">
+                <a:solidFill>
+                  <a:schemeClr val="bg1"/>
+                </a:solidFill>
+              </a:endParaRPr>
+            </a:p>
+          </p:txBody>
+        </p:sp>
+        <p:sp>
+          <p:nvSpPr>
+            <p:cNvPr id="7" name="Rectangle 6"/>
+            <p:cNvSpPr/>
+            <p:nvPr/>
+          </p:nvSpPr>
+          <p:spPr>
+            <a:xfrm>
+              <a:off x="3173864" y="2156569"/>
+              <a:ext cx="1522629" cy="958939"/>
+            </a:xfrm>
+            <a:prstGeom prst="rect">
+              <a:avLst/>
+            </a:prstGeom>
+            <a:solidFill>
+              <a:schemeClr val="accent1"/>
+            </a:solidFill>
+            <a:ln w="38100" cmpd="sng">
+              <a:solidFill>
+                <a:schemeClr val="tx1"/>
+              </a:solidFill>
+            </a:ln>
+          </p:spPr>
+          <p:style>
+            <a:lnRef idx="1">
+              <a:schemeClr val="accent1"/>
+            </a:lnRef>
+            <a:fillRef idx="3">
+              <a:schemeClr val="accent1"/>
+            </a:fillRef>
+            <a:effectRef idx="2">
+              <a:schemeClr val="accent1"/>
+            </a:effectRef>
+            <a:fontRef idx="minor">
+              <a:schemeClr val="lt1"/>
+            </a:fontRef>
+          </p:style>
+          <p:txBody>
+            <a:bodyPr rtlCol="0" anchor="ctr"/>
+            <a:lstStyle/>
+            <a:p>
+              <a:pPr algn="ctr"/>
+              <a:r>
+                <a:rPr lang="en-US" b="1" dirty="0" smtClean="0">
+                  <a:solidFill>
+                    <a:schemeClr val="bg1"/>
+                  </a:solidFill>
+                </a:rPr>
+                <a:t>Range Estimator and Enforcer</a:t>
+              </a:r>
+              <a:endParaRPr lang="en-US" b="1" dirty="0">
+                <a:solidFill>
+                  <a:schemeClr val="bg1"/>
+                </a:solidFill>
+              </a:endParaRPr>
+            </a:p>
+          </p:txBody>
+        </p:sp>
+        <p:sp>
+          <p:nvSpPr>
+            <p:cNvPr id="8" name="Rectangle 7"/>
+            <p:cNvSpPr/>
+            <p:nvPr/>
+          </p:nvSpPr>
+          <p:spPr>
+            <a:xfrm>
+              <a:off x="3173864" y="3297920"/>
+              <a:ext cx="1522629" cy="958939"/>
+            </a:xfrm>
+            <a:prstGeom prst="rect">
+              <a:avLst/>
+            </a:prstGeom>
+            <a:solidFill>
+              <a:schemeClr val="accent1"/>
+            </a:solidFill>
+            <a:ln w="38100" cmpd="sng">
+              <a:solidFill>
+                <a:schemeClr val="tx1"/>
+              </a:solidFill>
+            </a:ln>
+          </p:spPr>
+          <p:style>
+            <a:lnRef idx="1">
+              <a:schemeClr val="accent1"/>
+            </a:lnRef>
+            <a:fillRef idx="3">
+              <a:schemeClr val="accent1"/>
+            </a:fillRef>
+            <a:effectRef idx="2">
+              <a:schemeClr val="accent1"/>
+            </a:effectRef>
+            <a:fontRef idx="minor">
+              <a:schemeClr val="lt1"/>
+            </a:fontRef>
+          </p:style>
+          <p:txBody>
+            <a:bodyPr rtlCol="0" anchor="ctr"/>
+            <a:lstStyle/>
+            <a:p>
+              <a:pPr algn="ctr"/>
+              <a:r>
+                <a:rPr lang="en-US" b="1" dirty="0" smtClean="0">
+                  <a:solidFill>
+                    <a:schemeClr val="bg1"/>
+                  </a:solidFill>
+                </a:rPr>
+                <a:t>Sample and Aggregate Framework</a:t>
+              </a:r>
+              <a:endParaRPr lang="en-US" b="1" dirty="0">
+                <a:solidFill>
+                  <a:schemeClr val="bg1"/>
+                </a:solidFill>
+              </a:endParaRPr>
+            </a:p>
+          </p:txBody>
+        </p:sp>
+        <p:sp>
+          <p:nvSpPr>
+            <p:cNvPr id="9" name="Rectangle 8"/>
+            <p:cNvSpPr/>
+            <p:nvPr/>
+          </p:nvSpPr>
+          <p:spPr>
+            <a:xfrm>
+              <a:off x="3173864" y="4443964"/>
+              <a:ext cx="1522629" cy="958939"/>
+            </a:xfrm>
+            <a:prstGeom prst="rect">
+              <a:avLst/>
+            </a:prstGeom>
+            <a:solidFill>
+              <a:schemeClr val="accent1"/>
+            </a:solidFill>
+            <a:ln w="38100" cmpd="sng">
+              <a:solidFill>
+                <a:schemeClr val="tx1"/>
+              </a:solidFill>
+            </a:ln>
+          </p:spPr>
+          <p:style>
+            <a:lnRef idx="1">
+              <a:schemeClr val="accent1"/>
+            </a:lnRef>
+            <a:fillRef idx="3">
+              <a:schemeClr val="accent1"/>
+            </a:fillRef>
+            <a:effectRef idx="2">
+              <a:schemeClr val="accent1"/>
+            </a:effectRef>
+            <a:fontRef idx="minor">
+              <a:schemeClr val="lt1"/>
+            </a:fontRef>
+          </p:style>
+          <p:txBody>
+            <a:bodyPr rtlCol="0" anchor="ctr"/>
+            <a:lstStyle/>
+            <a:p>
+              <a:pPr algn="ctr"/>
+              <a:r>
+                <a:rPr lang="en-US" b="1" dirty="0" smtClean="0">
+                  <a:solidFill>
+                    <a:schemeClr val="bg1"/>
+                  </a:solidFill>
+                </a:rPr>
+                <a:t>Privacy Budget Manager</a:t>
+              </a:r>
+              <a:endParaRPr lang="en-US" b="1" dirty="0">
+                <a:solidFill>
+                  <a:schemeClr val="bg1"/>
+                </a:solidFill>
+              </a:endParaRPr>
+            </a:p>
+          </p:txBody>
+        </p:sp>
+        <p:sp>
+          <p:nvSpPr>
+            <p:cNvPr id="11" name="TextBox 10"/>
+            <p:cNvSpPr txBox="1"/>
+            <p:nvPr/>
+          </p:nvSpPr>
+          <p:spPr>
+            <a:xfrm>
+              <a:off x="1297475" y="5353931"/>
+              <a:ext cx="1434532" cy="646331"/>
+            </a:xfrm>
+            <a:prstGeom prst="rect">
+              <a:avLst/>
+            </a:prstGeom>
+            <a:noFill/>
+          </p:spPr>
+          <p:txBody>
+            <a:bodyPr wrap="square" rtlCol="0">
+              <a:spAutoFit/>
+            </a:bodyPr>
+            <a:lstStyle/>
+            <a:p>
+              <a:pPr algn="ctr"/>
+              <a:r>
+                <a:rPr lang="en-US" b="1" dirty="0" smtClean="0"/>
+                <a:t>Execution Layer</a:t>
+              </a:r>
+              <a:endParaRPr lang="en-US" b="1" dirty="0"/>
+            </a:p>
+          </p:txBody>
+        </p:sp>
+        <p:sp>
+          <p:nvSpPr>
+            <p:cNvPr id="12" name="TextBox 11"/>
+            <p:cNvSpPr txBox="1"/>
+            <p:nvPr/>
+          </p:nvSpPr>
+          <p:spPr>
+            <a:xfrm>
+              <a:off x="3033533" y="5366359"/>
+              <a:ext cx="1836567" cy="646331"/>
+            </a:xfrm>
+            <a:prstGeom prst="rect">
+              <a:avLst/>
+            </a:prstGeom>
+            <a:noFill/>
+          </p:spPr>
+          <p:txBody>
+            <a:bodyPr wrap="square" rtlCol="0">
+              <a:spAutoFit/>
+            </a:bodyPr>
+            <a:lstStyle/>
+            <a:p>
+              <a:pPr algn="ctr"/>
+              <a:r>
+                <a:rPr lang="en-US" b="1" dirty="0" smtClean="0"/>
+                <a:t>Data Access Layer</a:t>
+              </a:r>
+              <a:endParaRPr lang="en-US" b="1" dirty="0"/>
+            </a:p>
+          </p:txBody>
+        </p:sp>
+        <p:sp>
+          <p:nvSpPr>
+            <p:cNvPr id="13" name="Snip Diagonal Corner Rectangle 12"/>
+            <p:cNvSpPr/>
+            <p:nvPr/>
+          </p:nvSpPr>
+          <p:spPr>
+            <a:xfrm>
+              <a:off x="3173864" y="475097"/>
+              <a:ext cx="1522629" cy="886229"/>
+            </a:xfrm>
+            <a:prstGeom prst="snip2DiagRect">
+              <a:avLst/>
+            </a:prstGeom>
+            <a:solidFill>
+              <a:srgbClr val="4F81BD"/>
+            </a:solidFill>
+          </p:spPr>
+          <p:style>
+            <a:lnRef idx="1">
+              <a:schemeClr val="accent1"/>
+            </a:lnRef>
+            <a:fillRef idx="3">
+              <a:schemeClr val="accent1"/>
+            </a:fillRef>
+            <a:effectRef idx="2">
+              <a:schemeClr val="accent1"/>
+            </a:effectRef>
+            <a:fontRef idx="minor">
+              <a:schemeClr val="lt1"/>
+            </a:fontRef>
+          </p:style>
+          <p:txBody>
+            <a:bodyPr rtlCol="0" anchor="ctr"/>
+            <a:lstStyle/>
+            <a:p>
+              <a:pPr algn="ctr"/>
+              <a:r>
+                <a:rPr lang="en-US" b="1" dirty="0" smtClean="0"/>
+                <a:t>Range Translation Function</a:t>
+              </a:r>
+              <a:endParaRPr lang="en-US" b="1" dirty="0"/>
+            </a:p>
+          </p:txBody>
+        </p:sp>
+        <p:sp>
+          <p:nvSpPr>
+            <p:cNvPr id="14" name="Snip Diagonal Corner Rectangle 13"/>
+            <p:cNvSpPr/>
+            <p:nvPr/>
+          </p:nvSpPr>
+          <p:spPr>
+            <a:xfrm>
+              <a:off x="1297475" y="475097"/>
+              <a:ext cx="1525903" cy="886229"/>
+            </a:xfrm>
+            <a:prstGeom prst="snip2DiagRect">
+              <a:avLst/>
+            </a:prstGeom>
+            <a:solidFill>
+              <a:srgbClr val="4F81BD"/>
+            </a:solidFill>
+          </p:spPr>
+          <p:style>
+            <a:lnRef idx="1">
+              <a:schemeClr val="accent1"/>
+            </a:lnRef>
+            <a:fillRef idx="3">
+              <a:schemeClr val="accent1"/>
+            </a:fillRef>
+            <a:effectRef idx="2">
+              <a:schemeClr val="accent1"/>
+            </a:effectRef>
+            <a:fontRef idx="minor">
+              <a:schemeClr val="lt1"/>
+            </a:fontRef>
+          </p:style>
+          <p:txBody>
+            <a:bodyPr rtlCol="0" anchor="ctr"/>
+            <a:lstStyle/>
+            <a:p>
+              <a:pPr algn="ctr"/>
+              <a:r>
+                <a:rPr lang="en-US" b="1" dirty="0" smtClean="0"/>
+                <a:t>Data Analytics Program</a:t>
+              </a:r>
+              <a:endParaRPr lang="en-US" b="1" dirty="0"/>
+            </a:p>
+          </p:txBody>
+        </p:sp>
+        <p:sp>
+          <p:nvSpPr>
+            <p:cNvPr id="15" name="Can 14"/>
+            <p:cNvSpPr/>
+            <p:nvPr/>
+          </p:nvSpPr>
+          <p:spPr>
+            <a:xfrm>
+              <a:off x="5719854" y="3115508"/>
+              <a:ext cx="1142143" cy="1589731"/>
+            </a:xfrm>
+            <a:prstGeom prst="can">
+              <a:avLst/>
+            </a:prstGeom>
+            <a:solidFill>
+              <a:srgbClr val="4F81BD"/>
+            </a:solidFill>
+          </p:spPr>
+          <p:style>
+            <a:lnRef idx="1">
+              <a:schemeClr val="accent1"/>
+            </a:lnRef>
+            <a:fillRef idx="3">
+              <a:schemeClr val="accent1"/>
+            </a:fillRef>
+            <a:effectRef idx="2">
+              <a:schemeClr val="accent1"/>
+            </a:effectRef>
+            <a:fontRef idx="minor">
+              <a:schemeClr val="lt1"/>
+            </a:fontRef>
+          </p:style>
+          <p:txBody>
+            <a:bodyPr rtlCol="0" anchor="ctr"/>
+            <a:lstStyle/>
+            <a:p>
+              <a:pPr algn="ctr"/>
+              <a:r>
+                <a:rPr lang="en-US" b="1" dirty="0" smtClean="0"/>
+                <a:t>Data Set Manager</a:t>
+              </a:r>
+              <a:endParaRPr lang="en-US" b="1" dirty="0"/>
+            </a:p>
+          </p:txBody>
+        </p:sp>
+        <p:sp>
+          <p:nvSpPr>
+            <p:cNvPr id="16" name="TextBox 15"/>
+            <p:cNvSpPr txBox="1"/>
+            <p:nvPr/>
+          </p:nvSpPr>
+          <p:spPr>
+            <a:xfrm>
+              <a:off x="1297475" y="6030018"/>
+              <a:ext cx="3572626" cy="369332"/>
+            </a:xfrm>
+            <a:prstGeom prst="rect">
+              <a:avLst/>
+            </a:prstGeom>
+            <a:noFill/>
+          </p:spPr>
+          <p:txBody>
+            <a:bodyPr wrap="square" rtlCol="0">
+              <a:spAutoFit/>
+            </a:bodyPr>
+            <a:lstStyle/>
+            <a:p>
+              <a:pPr algn="ctr"/>
+              <a:r>
+                <a:rPr lang="en-US" b="1" dirty="0" smtClean="0"/>
+                <a:t>GUPT Computation Manager</a:t>
+              </a:r>
+              <a:endParaRPr lang="en-US" b="1" dirty="0"/>
+            </a:p>
+          </p:txBody>
+        </p:sp>
+        <p:sp>
+          <p:nvSpPr>
+            <p:cNvPr id="17" name="Left-Right Arrow 16"/>
+            <p:cNvSpPr/>
+            <p:nvPr/>
+          </p:nvSpPr>
+          <p:spPr>
+            <a:xfrm>
+              <a:off x="5039966" y="3901237"/>
+              <a:ext cx="656214" cy="237546"/>
+            </a:xfrm>
+            <a:prstGeom prst="leftRightArrow">
+              <a:avLst/>
+            </a:prstGeom>
+          </p:spPr>
+          <p:style>
+            <a:lnRef idx="1">
+              <a:schemeClr val="accent1"/>
+            </a:lnRef>
+            <a:fillRef idx="3">
+              <a:schemeClr val="accent1"/>
+            </a:fillRef>
+            <a:effectRef idx="2">
+              <a:schemeClr val="accent1"/>
+            </a:effectRef>
+            <a:fontRef idx="minor">
+              <a:schemeClr val="lt1"/>
+            </a:fontRef>
+          </p:style>
+          <p:txBody>
+            <a:bodyPr rtlCol="0" anchor="ctr"/>
+            <a:lstStyle/>
+            <a:p>
+              <a:pPr algn="ctr"/>
+              <a:endParaRPr lang="en-US"/>
+            </a:p>
+          </p:txBody>
+        </p:sp>
+        <p:sp>
+          <p:nvSpPr>
+            <p:cNvPr id="18" name="Left-Right Arrow 17"/>
+            <p:cNvSpPr/>
+            <p:nvPr/>
+          </p:nvSpPr>
+          <p:spPr>
+            <a:xfrm rot="16200000">
+              <a:off x="3761331" y="1486312"/>
+              <a:ext cx="448203" cy="237546"/>
+            </a:xfrm>
+            <a:prstGeom prst="leftRightArrow">
+              <a:avLst/>
+            </a:prstGeom>
+          </p:spPr>
+          <p:style>
+            <a:lnRef idx="1">
+              <a:schemeClr val="accent1"/>
+            </a:lnRef>
+            <a:fillRef idx="3">
+              <a:schemeClr val="accent1"/>
+            </a:fillRef>
+            <a:effectRef idx="2">
+              <a:schemeClr val="accent1"/>
+            </a:effectRef>
+            <a:fontRef idx="minor">
+              <a:schemeClr val="lt1"/>
+            </a:fontRef>
+          </p:style>
+          <p:txBody>
+            <a:bodyPr rtlCol="0" anchor="ctr"/>
+            <a:lstStyle/>
+            <a:p>
+              <a:pPr algn="ctr"/>
+              <a:endParaRPr lang="en-US"/>
+            </a:p>
+          </p:txBody>
+        </p:sp>
+        <p:sp>
+          <p:nvSpPr>
+            <p:cNvPr id="19" name="Left-Right Arrow 18"/>
+            <p:cNvSpPr/>
+            <p:nvPr/>
+          </p:nvSpPr>
+          <p:spPr>
+            <a:xfrm rot="16200000">
+              <a:off x="1821325" y="1486312"/>
+              <a:ext cx="448203" cy="237546"/>
+            </a:xfrm>
+            <a:prstGeom prst="leftRightArrow">
+              <a:avLst/>
+            </a:prstGeom>
+          </p:spPr>
+          <p:style>
+            <a:lnRef idx="1">
+              <a:schemeClr val="accent1"/>
+            </a:lnRef>
+            <a:fillRef idx="3">
+              <a:schemeClr val="accent1"/>
+            </a:fillRef>
+            <a:effectRef idx="2">
+              <a:schemeClr val="accent1"/>
+            </a:effectRef>
+            <a:fontRef idx="minor">
+              <a:schemeClr val="lt1"/>
+            </a:fontRef>
+          </p:style>
+          <p:txBody>
+            <a:bodyPr rtlCol="0" anchor="ctr"/>
+            <a:lstStyle/>
+            <a:p>
+              <a:pPr algn="ctr"/>
+              <a:endParaRPr lang="en-US"/>
+            </a:p>
+          </p:txBody>
+        </p:sp>
+      </p:grpSp>
+    </p:spTree>
+    <p:extLst>
+      <p:ext uri="{BB962C8B-B14F-4D97-AF65-F5344CB8AC3E}">
+        <p14:creationId xmlns:p14="http://schemas.microsoft.com/office/powerpoint/2010/main" val="3553409479"/>
       </p:ext>
     </p:extLst>
   </p:cSld>

</xml_diff>